<commit_message>
[done] importancy and urgency
</commit_message>
<xml_diff>
--- a/docs/design/design-20210219.pptx
+++ b/docs/design/design-20210219.pptx
@@ -6,6 +6,7 @@
   </p:sldMasterIdLst>
   <p:sldIdLst>
     <p:sldId id="256" r:id="rId2"/>
+    <p:sldId id="257" r:id="rId3"/>
   </p:sldIdLst>
   <p:sldSz cx="12192000" cy="6858000"/>
   <p:notesSz cx="6858000" cy="9144000"/>
@@ -104,6 +105,11 @@
       </a:defRPr>
     </a:lvl9pPr>
   </p:defaultTextStyle>
+  <p:extLst>
+    <p:ext uri="{EFAFB233-063F-42B5-8137-9DF3F51BA10A}">
+      <p15:sldGuideLst xmlns:p15="http://schemas.microsoft.com/office/powerpoint/2012/main"/>
+    </p:ext>
+  </p:extLst>
 </p:presentation>
 </file>
 
@@ -3411,6 +3417,298 @@
 </p:sld>
 </file>
 
+<file path=ppt/slides/slide2.xml><?xml version="1.0" encoding="utf-8"?>
+<p:sld xmlns:a="http://schemas.openxmlformats.org/drawingml/2006/main" xmlns:r="http://schemas.openxmlformats.org/officeDocument/2006/relationships" xmlns:p="http://schemas.openxmlformats.org/presentationml/2006/main">
+  <p:cSld>
+    <p:spTree>
+      <p:nvGrpSpPr>
+        <p:cNvPr id="1" name=""/>
+        <p:cNvGrpSpPr/>
+        <p:nvPr/>
+      </p:nvGrpSpPr>
+      <p:grpSpPr>
+        <a:xfrm>
+          <a:off x="0" y="0"/>
+          <a:ext cx="0" cy="0"/>
+          <a:chOff x="0" y="0"/>
+          <a:chExt cx="0" cy="0"/>
+        </a:xfrm>
+      </p:grpSpPr>
+      <p:sp>
+        <p:nvSpPr>
+          <p:cNvPr id="4" name="三角形 3">
+            <a:extLst>
+              <a:ext uri="{FF2B5EF4-FFF2-40B4-BE49-F238E27FC236}">
+                <a16:creationId xmlns:a16="http://schemas.microsoft.com/office/drawing/2014/main" id="{E3D33315-31FD-C94B-B17D-9C7A3FFD053F}"/>
+              </a:ext>
+            </a:extLst>
+          </p:cNvPr>
+          <p:cNvSpPr/>
+          <p:nvPr/>
+        </p:nvSpPr>
+        <p:spPr>
+          <a:xfrm>
+            <a:off x="891878" y="1608180"/>
+            <a:ext cx="2160000" cy="2160000"/>
+          </a:xfrm>
+          <a:prstGeom prst="triangle">
+            <a:avLst/>
+          </a:prstGeom>
+          <a:solidFill>
+            <a:srgbClr val="FF0000"/>
+          </a:solidFill>
+          <a:ln>
+            <a:solidFill>
+              <a:schemeClr val="bg2">
+                <a:lumMod val="75000"/>
+              </a:schemeClr>
+            </a:solidFill>
+          </a:ln>
+        </p:spPr>
+        <p:style>
+          <a:lnRef idx="0">
+            <a:schemeClr val="accent2"/>
+          </a:lnRef>
+          <a:fillRef idx="3">
+            <a:schemeClr val="accent2"/>
+          </a:fillRef>
+          <a:effectRef idx="3">
+            <a:schemeClr val="accent2"/>
+          </a:effectRef>
+          <a:fontRef idx="minor">
+            <a:schemeClr val="lt1"/>
+          </a:fontRef>
+        </p:style>
+        <p:txBody>
+          <a:bodyPr rtlCol="0" anchor="ctr"/>
+          <a:lstStyle/>
+          <a:p>
+            <a:pPr algn="ctr"/>
+            <a:r>
+              <a:rPr kumimoji="1" lang="en-US" altLang="zh-CN" sz="8800" b="1" dirty="0">
+                <a:latin typeface="Kaiti SC" panose="02010600040101010101" pitchFamily="2" charset="-122"/>
+                <a:ea typeface="Kaiti SC" panose="02010600040101010101" pitchFamily="2" charset="-122"/>
+              </a:rPr>
+              <a:t>1</a:t>
+            </a:r>
+            <a:endParaRPr kumimoji="1" lang="zh-CN" altLang="en-US" sz="8800" b="1" dirty="0">
+              <a:latin typeface="Kaiti SC" panose="02010600040101010101" pitchFamily="2" charset="-122"/>
+              <a:ea typeface="Kaiti SC" panose="02010600040101010101" pitchFamily="2" charset="-122"/>
+            </a:endParaRPr>
+          </a:p>
+        </p:txBody>
+      </p:sp>
+      <p:sp>
+        <p:nvSpPr>
+          <p:cNvPr id="5" name="三角形 4">
+            <a:extLst>
+              <a:ext uri="{FF2B5EF4-FFF2-40B4-BE49-F238E27FC236}">
+                <a16:creationId xmlns:a16="http://schemas.microsoft.com/office/drawing/2014/main" id="{4B19224E-F481-BE4F-BFFC-267445C58F3A}"/>
+              </a:ext>
+            </a:extLst>
+          </p:cNvPr>
+          <p:cNvSpPr/>
+          <p:nvPr/>
+        </p:nvSpPr>
+        <p:spPr>
+          <a:xfrm>
+            <a:off x="3497546" y="1608180"/>
+            <a:ext cx="2160000" cy="2160000"/>
+          </a:xfrm>
+          <a:prstGeom prst="triangle">
+            <a:avLst/>
+          </a:prstGeom>
+          <a:solidFill>
+            <a:srgbClr val="F4B448"/>
+          </a:solidFill>
+          <a:ln>
+            <a:solidFill>
+              <a:schemeClr val="bg2">
+                <a:lumMod val="75000"/>
+              </a:schemeClr>
+            </a:solidFill>
+          </a:ln>
+        </p:spPr>
+        <p:style>
+          <a:lnRef idx="0">
+            <a:schemeClr val="accent2"/>
+          </a:lnRef>
+          <a:fillRef idx="3">
+            <a:schemeClr val="accent2"/>
+          </a:fillRef>
+          <a:effectRef idx="3">
+            <a:schemeClr val="accent2"/>
+          </a:effectRef>
+          <a:fontRef idx="minor">
+            <a:schemeClr val="lt1"/>
+          </a:fontRef>
+        </p:style>
+        <p:txBody>
+          <a:bodyPr rtlCol="0" anchor="ctr"/>
+          <a:lstStyle/>
+          <a:p>
+            <a:pPr algn="ctr"/>
+            <a:r>
+              <a:rPr kumimoji="1" lang="en-US" altLang="zh-CN" sz="8800" b="1" dirty="0">
+                <a:latin typeface="Kaiti SC" panose="02010600040101010101" pitchFamily="2" charset="-122"/>
+                <a:ea typeface="Kaiti SC" panose="02010600040101010101" pitchFamily="2" charset="-122"/>
+              </a:rPr>
+              <a:t>2</a:t>
+            </a:r>
+            <a:endParaRPr kumimoji="1" lang="zh-CN" altLang="en-US" sz="8800" b="1" dirty="0">
+              <a:latin typeface="Kaiti SC" panose="02010600040101010101" pitchFamily="2" charset="-122"/>
+              <a:ea typeface="Kaiti SC" panose="02010600040101010101" pitchFamily="2" charset="-122"/>
+            </a:endParaRPr>
+          </a:p>
+        </p:txBody>
+      </p:sp>
+      <p:sp>
+        <p:nvSpPr>
+          <p:cNvPr id="6" name="三角形 5">
+            <a:extLst>
+              <a:ext uri="{FF2B5EF4-FFF2-40B4-BE49-F238E27FC236}">
+                <a16:creationId xmlns:a16="http://schemas.microsoft.com/office/drawing/2014/main" id="{8300B645-06C2-674A-B40D-EC21C8FF4822}"/>
+              </a:ext>
+            </a:extLst>
+          </p:cNvPr>
+          <p:cNvSpPr/>
+          <p:nvPr/>
+        </p:nvSpPr>
+        <p:spPr>
+          <a:xfrm>
+            <a:off x="6103214" y="1608180"/>
+            <a:ext cx="2160000" cy="2160000"/>
+          </a:xfrm>
+          <a:prstGeom prst="triangle">
+            <a:avLst/>
+          </a:prstGeom>
+          <a:solidFill>
+            <a:schemeClr val="accent4">
+              <a:lumMod val="75000"/>
+            </a:schemeClr>
+          </a:solidFill>
+          <a:ln>
+            <a:solidFill>
+              <a:schemeClr val="bg2">
+                <a:lumMod val="75000"/>
+              </a:schemeClr>
+            </a:solidFill>
+          </a:ln>
+        </p:spPr>
+        <p:style>
+          <a:lnRef idx="0">
+            <a:schemeClr val="accent2"/>
+          </a:lnRef>
+          <a:fillRef idx="3">
+            <a:schemeClr val="accent2"/>
+          </a:fillRef>
+          <a:effectRef idx="3">
+            <a:schemeClr val="accent2"/>
+          </a:effectRef>
+          <a:fontRef idx="minor">
+            <a:schemeClr val="lt1"/>
+          </a:fontRef>
+        </p:style>
+        <p:txBody>
+          <a:bodyPr rtlCol="0" anchor="ctr"/>
+          <a:lstStyle/>
+          <a:p>
+            <a:pPr algn="ctr"/>
+            <a:r>
+              <a:rPr kumimoji="1" lang="en-US" altLang="zh-CN" sz="8800" b="1" dirty="0">
+                <a:latin typeface="Kaiti SC" panose="02010600040101010101" pitchFamily="2" charset="-122"/>
+                <a:ea typeface="Kaiti SC" panose="02010600040101010101" pitchFamily="2" charset="-122"/>
+              </a:rPr>
+              <a:t>3</a:t>
+            </a:r>
+            <a:endParaRPr kumimoji="1" lang="zh-CN" altLang="en-US" sz="8800" b="1" dirty="0">
+              <a:latin typeface="Kaiti SC" panose="02010600040101010101" pitchFamily="2" charset="-122"/>
+              <a:ea typeface="Kaiti SC" panose="02010600040101010101" pitchFamily="2" charset="-122"/>
+            </a:endParaRPr>
+          </a:p>
+        </p:txBody>
+      </p:sp>
+      <p:sp>
+        <p:nvSpPr>
+          <p:cNvPr id="7" name="三角形 6">
+            <a:extLst>
+              <a:ext uri="{FF2B5EF4-FFF2-40B4-BE49-F238E27FC236}">
+                <a16:creationId xmlns:a16="http://schemas.microsoft.com/office/drawing/2014/main" id="{5A5C0C05-A5D9-794B-8AE0-3283E221C9CF}"/>
+              </a:ext>
+            </a:extLst>
+          </p:cNvPr>
+          <p:cNvSpPr/>
+          <p:nvPr/>
+        </p:nvSpPr>
+        <p:spPr>
+          <a:xfrm>
+            <a:off x="8708882" y="1608180"/>
+            <a:ext cx="2160000" cy="2160000"/>
+          </a:xfrm>
+          <a:prstGeom prst="triangle">
+            <a:avLst/>
+          </a:prstGeom>
+          <a:solidFill>
+            <a:schemeClr val="accent5">
+              <a:lumMod val="60000"/>
+              <a:lumOff val="40000"/>
+            </a:schemeClr>
+          </a:solidFill>
+          <a:ln>
+            <a:solidFill>
+              <a:schemeClr val="accent1">
+                <a:lumMod val="40000"/>
+                <a:lumOff val="60000"/>
+              </a:schemeClr>
+            </a:solidFill>
+          </a:ln>
+        </p:spPr>
+        <p:style>
+          <a:lnRef idx="0">
+            <a:schemeClr val="accent2"/>
+          </a:lnRef>
+          <a:fillRef idx="3">
+            <a:schemeClr val="accent2"/>
+          </a:fillRef>
+          <a:effectRef idx="3">
+            <a:schemeClr val="accent2"/>
+          </a:effectRef>
+          <a:fontRef idx="minor">
+            <a:schemeClr val="lt1"/>
+          </a:fontRef>
+        </p:style>
+        <p:txBody>
+          <a:bodyPr rtlCol="0" anchor="ctr"/>
+          <a:lstStyle/>
+          <a:p>
+            <a:pPr algn="ctr"/>
+            <a:r>
+              <a:rPr kumimoji="1" lang="en-US" altLang="zh-CN" sz="8800" b="1" dirty="0">
+                <a:latin typeface="Kaiti SC" panose="02010600040101010101" pitchFamily="2" charset="-122"/>
+                <a:ea typeface="Kaiti SC" panose="02010600040101010101" pitchFamily="2" charset="-122"/>
+              </a:rPr>
+              <a:t>4</a:t>
+            </a:r>
+            <a:endParaRPr kumimoji="1" lang="zh-CN" altLang="en-US" sz="8800" b="1" dirty="0">
+              <a:latin typeface="Kaiti SC" panose="02010600040101010101" pitchFamily="2" charset="-122"/>
+              <a:ea typeface="Kaiti SC" panose="02010600040101010101" pitchFamily="2" charset="-122"/>
+            </a:endParaRPr>
+          </a:p>
+        </p:txBody>
+      </p:sp>
+    </p:spTree>
+    <p:extLst>
+      <p:ext uri="{BB962C8B-B14F-4D97-AF65-F5344CB8AC3E}">
+        <p14:creationId xmlns:p14="http://schemas.microsoft.com/office/powerpoint/2010/main" val="1226780478"/>
+      </p:ext>
+    </p:extLst>
+  </p:cSld>
+  <p:clrMapOvr>
+    <a:masterClrMapping/>
+  </p:clrMapOvr>
+</p:sld>
+</file>
+
 <file path=ppt/theme/theme1.xml><?xml version="1.0" encoding="utf-8"?>
 <a:theme xmlns:a="http://schemas.openxmlformats.org/drawingml/2006/main" name="Office 主题​​">
   <a:themeElements>

</xml_diff>

<commit_message>
face ui with css
</commit_message>
<xml_diff>
--- a/docs/design/design-20210219.pptx
+++ b/docs/design/design-20210219.pptx
@@ -7,6 +7,8 @@
   <p:sldIdLst>
     <p:sldId id="256" r:id="rId2"/>
     <p:sldId id="257" r:id="rId3"/>
+    <p:sldId id="258" r:id="rId4"/>
+    <p:sldId id="259" r:id="rId5"/>
   </p:sldIdLst>
   <p:sldSz cx="12192000" cy="6858000"/>
   <p:notesSz cx="6858000" cy="9144000"/>
@@ -260,7 +262,7 @@
           <a:p>
             <a:fld id="{D8B5B211-85AB-A647-A53B-842B83506EF8}" type="datetimeFigureOut">
               <a:rPr kumimoji="1" lang="zh-CN" altLang="en-US" smtClean="0"/>
-              <a:t>2021/2/19</a:t>
+              <a:t>2021/2/21</a:t>
             </a:fld>
             <a:endParaRPr kumimoji="1" lang="zh-CN" altLang="en-US"/>
           </a:p>
@@ -458,7 +460,7 @@
           <a:p>
             <a:fld id="{D8B5B211-85AB-A647-A53B-842B83506EF8}" type="datetimeFigureOut">
               <a:rPr kumimoji="1" lang="zh-CN" altLang="en-US" smtClean="0"/>
-              <a:t>2021/2/19</a:t>
+              <a:t>2021/2/21</a:t>
             </a:fld>
             <a:endParaRPr kumimoji="1" lang="zh-CN" altLang="en-US"/>
           </a:p>
@@ -666,7 +668,7 @@
           <a:p>
             <a:fld id="{D8B5B211-85AB-A647-A53B-842B83506EF8}" type="datetimeFigureOut">
               <a:rPr kumimoji="1" lang="zh-CN" altLang="en-US" smtClean="0"/>
-              <a:t>2021/2/19</a:t>
+              <a:t>2021/2/21</a:t>
             </a:fld>
             <a:endParaRPr kumimoji="1" lang="zh-CN" altLang="en-US"/>
           </a:p>
@@ -864,7 +866,7 @@
           <a:p>
             <a:fld id="{D8B5B211-85AB-A647-A53B-842B83506EF8}" type="datetimeFigureOut">
               <a:rPr kumimoji="1" lang="zh-CN" altLang="en-US" smtClean="0"/>
-              <a:t>2021/2/19</a:t>
+              <a:t>2021/2/21</a:t>
             </a:fld>
             <a:endParaRPr kumimoji="1" lang="zh-CN" altLang="en-US"/>
           </a:p>
@@ -1139,7 +1141,7 @@
           <a:p>
             <a:fld id="{D8B5B211-85AB-A647-A53B-842B83506EF8}" type="datetimeFigureOut">
               <a:rPr kumimoji="1" lang="zh-CN" altLang="en-US" smtClean="0"/>
-              <a:t>2021/2/19</a:t>
+              <a:t>2021/2/21</a:t>
             </a:fld>
             <a:endParaRPr kumimoji="1" lang="zh-CN" altLang="en-US"/>
           </a:p>
@@ -1404,7 +1406,7 @@
           <a:p>
             <a:fld id="{D8B5B211-85AB-A647-A53B-842B83506EF8}" type="datetimeFigureOut">
               <a:rPr kumimoji="1" lang="zh-CN" altLang="en-US" smtClean="0"/>
-              <a:t>2021/2/19</a:t>
+              <a:t>2021/2/21</a:t>
             </a:fld>
             <a:endParaRPr kumimoji="1" lang="zh-CN" altLang="en-US"/>
           </a:p>
@@ -1816,7 +1818,7 @@
           <a:p>
             <a:fld id="{D8B5B211-85AB-A647-A53B-842B83506EF8}" type="datetimeFigureOut">
               <a:rPr kumimoji="1" lang="zh-CN" altLang="en-US" smtClean="0"/>
-              <a:t>2021/2/19</a:t>
+              <a:t>2021/2/21</a:t>
             </a:fld>
             <a:endParaRPr kumimoji="1" lang="zh-CN" altLang="en-US"/>
           </a:p>
@@ -1957,7 +1959,7 @@
           <a:p>
             <a:fld id="{D8B5B211-85AB-A647-A53B-842B83506EF8}" type="datetimeFigureOut">
               <a:rPr kumimoji="1" lang="zh-CN" altLang="en-US" smtClean="0"/>
-              <a:t>2021/2/19</a:t>
+              <a:t>2021/2/21</a:t>
             </a:fld>
             <a:endParaRPr kumimoji="1" lang="zh-CN" altLang="en-US"/>
           </a:p>
@@ -2070,7 +2072,7 @@
           <a:p>
             <a:fld id="{D8B5B211-85AB-A647-A53B-842B83506EF8}" type="datetimeFigureOut">
               <a:rPr kumimoji="1" lang="zh-CN" altLang="en-US" smtClean="0"/>
-              <a:t>2021/2/19</a:t>
+              <a:t>2021/2/21</a:t>
             </a:fld>
             <a:endParaRPr kumimoji="1" lang="zh-CN" altLang="en-US"/>
           </a:p>
@@ -2381,7 +2383,7 @@
           <a:p>
             <a:fld id="{D8B5B211-85AB-A647-A53B-842B83506EF8}" type="datetimeFigureOut">
               <a:rPr kumimoji="1" lang="zh-CN" altLang="en-US" smtClean="0"/>
-              <a:t>2021/2/19</a:t>
+              <a:t>2021/2/21</a:t>
             </a:fld>
             <a:endParaRPr kumimoji="1" lang="zh-CN" altLang="en-US"/>
           </a:p>
@@ -2669,7 +2671,7 @@
           <a:p>
             <a:fld id="{D8B5B211-85AB-A647-A53B-842B83506EF8}" type="datetimeFigureOut">
               <a:rPr kumimoji="1" lang="zh-CN" altLang="en-US" smtClean="0"/>
-              <a:t>2021/2/19</a:t>
+              <a:t>2021/2/21</a:t>
             </a:fld>
             <a:endParaRPr kumimoji="1" lang="zh-CN" altLang="en-US"/>
           </a:p>
@@ -2910,7 +2912,7 @@
           <a:p>
             <a:fld id="{D8B5B211-85AB-A647-A53B-842B83506EF8}" type="datetimeFigureOut">
               <a:rPr kumimoji="1" lang="zh-CN" altLang="en-US" smtClean="0"/>
-              <a:t>2021/2/19</a:t>
+              <a:t>2021/2/21</a:t>
             </a:fld>
             <a:endParaRPr kumimoji="1" lang="zh-CN" altLang="en-US"/>
           </a:p>
@@ -3709,6 +3711,610 @@
 </p:sld>
 </file>
 
+<file path=ppt/slides/slide3.xml><?xml version="1.0" encoding="utf-8"?>
+<p:sld xmlns:a="http://schemas.openxmlformats.org/drawingml/2006/main" xmlns:r="http://schemas.openxmlformats.org/officeDocument/2006/relationships" xmlns:p="http://schemas.openxmlformats.org/presentationml/2006/main">
+  <p:cSld>
+    <p:spTree>
+      <p:nvGrpSpPr>
+        <p:cNvPr id="1" name=""/>
+        <p:cNvGrpSpPr/>
+        <p:nvPr/>
+      </p:nvGrpSpPr>
+      <p:grpSpPr>
+        <a:xfrm>
+          <a:off x="0" y="0"/>
+          <a:ext cx="0" cy="0"/>
+          <a:chOff x="0" y="0"/>
+          <a:chExt cx="0" cy="0"/>
+        </a:xfrm>
+      </p:grpSpPr>
+      <p:sp>
+        <p:nvSpPr>
+          <p:cNvPr id="2" name="矩形 1">
+            <a:extLst>
+              <a:ext uri="{FF2B5EF4-FFF2-40B4-BE49-F238E27FC236}">
+                <a16:creationId xmlns:a16="http://schemas.microsoft.com/office/drawing/2014/main" id="{E2CF13EE-A816-594B-B63A-E7F9414C2521}"/>
+              </a:ext>
+            </a:extLst>
+          </p:cNvPr>
+          <p:cNvSpPr/>
+          <p:nvPr/>
+        </p:nvSpPr>
+        <p:spPr>
+          <a:xfrm>
+            <a:off x="1608020" y="2319750"/>
+            <a:ext cx="867545" cy="1569660"/>
+          </a:xfrm>
+          <a:prstGeom prst="rect">
+            <a:avLst/>
+          </a:prstGeom>
+          <a:solidFill>
+            <a:srgbClr val="FF0000"/>
+          </a:solidFill>
+          <a:ln>
+            <a:solidFill>
+              <a:schemeClr val="bg1">
+                <a:lumMod val="50000"/>
+              </a:schemeClr>
+            </a:solidFill>
+          </a:ln>
+        </p:spPr>
+        <p:txBody>
+          <a:bodyPr wrap="none">
+            <a:spAutoFit/>
+          </a:bodyPr>
+          <a:lstStyle/>
+          <a:p>
+            <a:pPr algn="ctr"/>
+            <a:r>
+              <a:rPr kumimoji="1" lang="en-US" altLang="zh-CN" sz="9600" b="1" dirty="0">
+                <a:solidFill>
+                  <a:schemeClr val="bg1"/>
+                </a:solidFill>
+                <a:latin typeface="DengXian" panose="02010600030101010101" pitchFamily="2" charset="-122"/>
+                <a:ea typeface="DengXian" panose="02010600030101010101" pitchFamily="2" charset="-122"/>
+              </a:rPr>
+              <a:t>1</a:t>
+            </a:r>
+            <a:endParaRPr kumimoji="1" lang="zh-CN" altLang="en-US" sz="9600" b="1" dirty="0">
+              <a:solidFill>
+                <a:schemeClr val="bg1"/>
+              </a:solidFill>
+              <a:latin typeface="DengXian" panose="02010600030101010101" pitchFamily="2" charset="-122"/>
+              <a:ea typeface="DengXian" panose="02010600030101010101" pitchFamily="2" charset="-122"/>
+            </a:endParaRPr>
+          </a:p>
+        </p:txBody>
+      </p:sp>
+      <p:sp>
+        <p:nvSpPr>
+          <p:cNvPr id="3" name="矩形 2">
+            <a:extLst>
+              <a:ext uri="{FF2B5EF4-FFF2-40B4-BE49-F238E27FC236}">
+                <a16:creationId xmlns:a16="http://schemas.microsoft.com/office/drawing/2014/main" id="{998BAF83-2D3C-454F-8170-173BF5C214CE}"/>
+              </a:ext>
+            </a:extLst>
+          </p:cNvPr>
+          <p:cNvSpPr/>
+          <p:nvPr/>
+        </p:nvSpPr>
+        <p:spPr>
+          <a:xfrm>
+            <a:off x="4349847" y="2319750"/>
+            <a:ext cx="867545" cy="1569660"/>
+          </a:xfrm>
+          <a:prstGeom prst="rect">
+            <a:avLst/>
+          </a:prstGeom>
+          <a:solidFill>
+            <a:schemeClr val="accent2">
+              <a:lumMod val="75000"/>
+            </a:schemeClr>
+          </a:solidFill>
+          <a:ln>
+            <a:solidFill>
+              <a:schemeClr val="bg1">
+                <a:lumMod val="50000"/>
+              </a:schemeClr>
+            </a:solidFill>
+          </a:ln>
+        </p:spPr>
+        <p:txBody>
+          <a:bodyPr wrap="none">
+            <a:spAutoFit/>
+          </a:bodyPr>
+          <a:lstStyle/>
+          <a:p>
+            <a:pPr algn="ctr"/>
+            <a:r>
+              <a:rPr kumimoji="1" lang="en-US" altLang="zh-CN" sz="9600" b="1" dirty="0">
+                <a:solidFill>
+                  <a:schemeClr val="bg1"/>
+                </a:solidFill>
+                <a:latin typeface="DengXian" panose="02010600030101010101" pitchFamily="2" charset="-122"/>
+                <a:ea typeface="DengXian" panose="02010600030101010101" pitchFamily="2" charset="-122"/>
+              </a:rPr>
+              <a:t>2</a:t>
+            </a:r>
+            <a:endParaRPr kumimoji="1" lang="zh-CN" altLang="en-US" sz="9600" b="1" dirty="0">
+              <a:solidFill>
+                <a:schemeClr val="bg1"/>
+              </a:solidFill>
+              <a:latin typeface="DengXian" panose="02010600030101010101" pitchFamily="2" charset="-122"/>
+              <a:ea typeface="DengXian" panose="02010600030101010101" pitchFamily="2" charset="-122"/>
+            </a:endParaRPr>
+          </a:p>
+        </p:txBody>
+      </p:sp>
+      <p:sp>
+        <p:nvSpPr>
+          <p:cNvPr id="5" name="矩形 4">
+            <a:extLst>
+              <a:ext uri="{FF2B5EF4-FFF2-40B4-BE49-F238E27FC236}">
+                <a16:creationId xmlns:a16="http://schemas.microsoft.com/office/drawing/2014/main" id="{B71BA591-BA71-2642-8BCA-F75579A62938}"/>
+              </a:ext>
+            </a:extLst>
+          </p:cNvPr>
+          <p:cNvSpPr/>
+          <p:nvPr/>
+        </p:nvSpPr>
+        <p:spPr>
+          <a:xfrm>
+            <a:off x="7091674" y="2319750"/>
+            <a:ext cx="867545" cy="1569660"/>
+          </a:xfrm>
+          <a:prstGeom prst="rect">
+            <a:avLst/>
+          </a:prstGeom>
+          <a:solidFill>
+            <a:schemeClr val="accent2">
+              <a:lumMod val="60000"/>
+              <a:lumOff val="40000"/>
+            </a:schemeClr>
+          </a:solidFill>
+          <a:ln>
+            <a:solidFill>
+              <a:schemeClr val="bg1">
+                <a:lumMod val="50000"/>
+              </a:schemeClr>
+            </a:solidFill>
+          </a:ln>
+        </p:spPr>
+        <p:txBody>
+          <a:bodyPr wrap="none">
+            <a:spAutoFit/>
+          </a:bodyPr>
+          <a:lstStyle/>
+          <a:p>
+            <a:pPr algn="ctr"/>
+            <a:r>
+              <a:rPr kumimoji="1" lang="en-US" altLang="zh-CN" sz="9600" b="1" dirty="0">
+                <a:solidFill>
+                  <a:schemeClr val="bg1"/>
+                </a:solidFill>
+                <a:latin typeface="DengXian" panose="02010600030101010101" pitchFamily="2" charset="-122"/>
+                <a:ea typeface="DengXian" panose="02010600030101010101" pitchFamily="2" charset="-122"/>
+              </a:rPr>
+              <a:t>3</a:t>
+            </a:r>
+            <a:endParaRPr kumimoji="1" lang="zh-CN" altLang="en-US" sz="9600" b="1" dirty="0">
+              <a:solidFill>
+                <a:schemeClr val="bg1"/>
+              </a:solidFill>
+              <a:latin typeface="DengXian" panose="02010600030101010101" pitchFamily="2" charset="-122"/>
+              <a:ea typeface="DengXian" panose="02010600030101010101" pitchFamily="2" charset="-122"/>
+            </a:endParaRPr>
+          </a:p>
+        </p:txBody>
+      </p:sp>
+      <p:sp>
+        <p:nvSpPr>
+          <p:cNvPr id="9" name="矩形 8">
+            <a:extLst>
+              <a:ext uri="{FF2B5EF4-FFF2-40B4-BE49-F238E27FC236}">
+                <a16:creationId xmlns:a16="http://schemas.microsoft.com/office/drawing/2014/main" id="{12C178F8-CEB6-2C4E-A34B-751C9ED19669}"/>
+              </a:ext>
+            </a:extLst>
+          </p:cNvPr>
+          <p:cNvSpPr/>
+          <p:nvPr/>
+        </p:nvSpPr>
+        <p:spPr>
+          <a:xfrm>
+            <a:off x="9833501" y="2319750"/>
+            <a:ext cx="867545" cy="1569660"/>
+          </a:xfrm>
+          <a:prstGeom prst="rect">
+            <a:avLst/>
+          </a:prstGeom>
+          <a:solidFill>
+            <a:schemeClr val="accent2">
+              <a:lumMod val="40000"/>
+              <a:lumOff val="60000"/>
+            </a:schemeClr>
+          </a:solidFill>
+          <a:ln>
+            <a:solidFill>
+              <a:schemeClr val="bg1">
+                <a:lumMod val="50000"/>
+              </a:schemeClr>
+            </a:solidFill>
+          </a:ln>
+        </p:spPr>
+        <p:txBody>
+          <a:bodyPr wrap="none">
+            <a:spAutoFit/>
+          </a:bodyPr>
+          <a:lstStyle/>
+          <a:p>
+            <a:pPr algn="ctr"/>
+            <a:r>
+              <a:rPr kumimoji="1" lang="en-US" altLang="zh-CN" sz="9600" b="1" dirty="0">
+                <a:solidFill>
+                  <a:schemeClr val="bg1"/>
+                </a:solidFill>
+                <a:latin typeface="DengXian" panose="02010600030101010101" pitchFamily="2" charset="-122"/>
+                <a:ea typeface="DengXian" panose="02010600030101010101" pitchFamily="2" charset="-122"/>
+              </a:rPr>
+              <a:t>4</a:t>
+            </a:r>
+            <a:endParaRPr kumimoji="1" lang="zh-CN" altLang="en-US" sz="9600" b="1" dirty="0">
+              <a:solidFill>
+                <a:schemeClr val="bg1"/>
+              </a:solidFill>
+              <a:latin typeface="DengXian" panose="02010600030101010101" pitchFamily="2" charset="-122"/>
+              <a:ea typeface="DengXian" panose="02010600030101010101" pitchFamily="2" charset="-122"/>
+            </a:endParaRPr>
+          </a:p>
+        </p:txBody>
+      </p:sp>
+    </p:spTree>
+    <p:extLst>
+      <p:ext uri="{BB962C8B-B14F-4D97-AF65-F5344CB8AC3E}">
+        <p14:creationId xmlns:p14="http://schemas.microsoft.com/office/powerpoint/2010/main" val="3883592771"/>
+      </p:ext>
+    </p:extLst>
+  </p:cSld>
+  <p:clrMapOvr>
+    <a:masterClrMapping/>
+  </p:clrMapOvr>
+</p:sld>
+</file>
+
+<file path=ppt/slides/slide4.xml><?xml version="1.0" encoding="utf-8"?>
+<p:sld xmlns:a="http://schemas.openxmlformats.org/drawingml/2006/main" xmlns:r="http://schemas.openxmlformats.org/officeDocument/2006/relationships" xmlns:p="http://schemas.openxmlformats.org/presentationml/2006/main">
+  <p:cSld>
+    <p:spTree>
+      <p:nvGrpSpPr>
+        <p:cNvPr id="1" name=""/>
+        <p:cNvGrpSpPr/>
+        <p:nvPr/>
+      </p:nvGrpSpPr>
+      <p:grpSpPr>
+        <a:xfrm>
+          <a:off x="0" y="0"/>
+          <a:ext cx="0" cy="0"/>
+          <a:chOff x="0" y="0"/>
+          <a:chExt cx="0" cy="0"/>
+        </a:xfrm>
+      </p:grpSpPr>
+      <p:sp>
+        <p:nvSpPr>
+          <p:cNvPr id="4" name="矩形 3">
+            <a:extLst>
+              <a:ext uri="{FF2B5EF4-FFF2-40B4-BE49-F238E27FC236}">
+                <a16:creationId xmlns:a16="http://schemas.microsoft.com/office/drawing/2014/main" id="{F9FBE9BF-C638-A64E-92AC-A1F9609F9A3B}"/>
+              </a:ext>
+            </a:extLst>
+          </p:cNvPr>
+          <p:cNvSpPr/>
+          <p:nvPr/>
+        </p:nvSpPr>
+        <p:spPr>
+          <a:xfrm>
+            <a:off x="2070847" y="1954306"/>
+            <a:ext cx="412377" cy="546847"/>
+          </a:xfrm>
+          <a:prstGeom prst="rect">
+            <a:avLst/>
+          </a:prstGeom>
+          <a:noFill/>
+          <a:ln w="9525" cap="flat" cmpd="sng" algn="ctr">
+            <a:solidFill>
+              <a:schemeClr val="bg1">
+                <a:lumMod val="85000"/>
+              </a:schemeClr>
+            </a:solidFill>
+            <a:prstDash val="solid"/>
+            <a:round/>
+            <a:headEnd type="none" w="med" len="med"/>
+            <a:tailEnd type="none" w="med" len="med"/>
+          </a:ln>
+        </p:spPr>
+        <p:style>
+          <a:lnRef idx="0">
+            <a:scrgbClr r="0" g="0" b="0"/>
+          </a:lnRef>
+          <a:fillRef idx="0">
+            <a:scrgbClr r="0" g="0" b="0"/>
+          </a:fillRef>
+          <a:effectRef idx="0">
+            <a:scrgbClr r="0" g="0" b="0"/>
+          </a:effectRef>
+          <a:fontRef idx="minor">
+            <a:schemeClr val="accent1"/>
+          </a:fontRef>
+        </p:style>
+        <p:txBody>
+          <a:bodyPr rtlCol="0" anchor="ctr"/>
+          <a:lstStyle/>
+          <a:p>
+            <a:pPr algn="ctr"/>
+            <a:r>
+              <a:rPr kumimoji="1" lang="en-US" altLang="zh-CN" sz="4400" b="1" dirty="0">
+                <a:solidFill>
+                  <a:srgbClr val="FF0000"/>
+                </a:solidFill>
+                <a:latin typeface="Songti SC" panose="02010600040101010101" pitchFamily="2" charset="-122"/>
+                <a:ea typeface="Songti SC" panose="02010600040101010101" pitchFamily="2" charset="-122"/>
+              </a:rPr>
+              <a:t>1</a:t>
+            </a:r>
+            <a:endParaRPr kumimoji="1" lang="zh-CN" altLang="en-US" sz="4400" b="1" dirty="0">
+              <a:solidFill>
+                <a:srgbClr val="FF0000"/>
+              </a:solidFill>
+              <a:latin typeface="Songti SC" panose="02010600040101010101" pitchFamily="2" charset="-122"/>
+              <a:ea typeface="Songti SC" panose="02010600040101010101" pitchFamily="2" charset="-122"/>
+            </a:endParaRPr>
+          </a:p>
+        </p:txBody>
+      </p:sp>
+      <p:sp>
+        <p:nvSpPr>
+          <p:cNvPr id="6" name="矩形 5">
+            <a:extLst>
+              <a:ext uri="{FF2B5EF4-FFF2-40B4-BE49-F238E27FC236}">
+                <a16:creationId xmlns:a16="http://schemas.microsoft.com/office/drawing/2014/main" id="{AA3269E1-AF6A-EE42-A229-F13B41874D49}"/>
+              </a:ext>
+            </a:extLst>
+          </p:cNvPr>
+          <p:cNvSpPr/>
+          <p:nvPr/>
+        </p:nvSpPr>
+        <p:spPr>
+          <a:xfrm>
+            <a:off x="2886635" y="1954306"/>
+            <a:ext cx="412377" cy="546847"/>
+          </a:xfrm>
+          <a:prstGeom prst="rect">
+            <a:avLst/>
+          </a:prstGeom>
+          <a:noFill/>
+          <a:ln w="9525" cap="flat" cmpd="sng" algn="ctr">
+            <a:solidFill>
+              <a:schemeClr val="bg1">
+                <a:lumMod val="85000"/>
+              </a:schemeClr>
+            </a:solidFill>
+            <a:prstDash val="solid"/>
+            <a:round/>
+            <a:headEnd type="none" w="med" len="med"/>
+            <a:tailEnd type="none" w="med" len="med"/>
+          </a:ln>
+        </p:spPr>
+        <p:style>
+          <a:lnRef idx="0">
+            <a:scrgbClr r="0" g="0" b="0"/>
+          </a:lnRef>
+          <a:fillRef idx="0">
+            <a:scrgbClr r="0" g="0" b="0"/>
+          </a:fillRef>
+          <a:effectRef idx="0">
+            <a:scrgbClr r="0" g="0" b="0"/>
+          </a:effectRef>
+          <a:fontRef idx="minor">
+            <a:schemeClr val="accent1"/>
+          </a:fontRef>
+        </p:style>
+        <p:txBody>
+          <a:bodyPr rtlCol="0" anchor="ctr"/>
+          <a:lstStyle/>
+          <a:p>
+            <a:pPr algn="ctr"/>
+            <a:r>
+              <a:rPr kumimoji="1" lang="en-US" altLang="zh-CN" sz="4400" b="1" dirty="0">
+                <a:solidFill>
+                  <a:schemeClr val="accent2">
+                    <a:lumMod val="75000"/>
+                  </a:schemeClr>
+                </a:solidFill>
+                <a:latin typeface="Songti SC" panose="02010600040101010101" pitchFamily="2" charset="-122"/>
+                <a:ea typeface="Songti SC" panose="02010600040101010101" pitchFamily="2" charset="-122"/>
+              </a:rPr>
+              <a:t>2</a:t>
+            </a:r>
+            <a:endParaRPr kumimoji="1" lang="zh-CN" altLang="en-US" sz="4400" b="1" dirty="0">
+              <a:solidFill>
+                <a:schemeClr val="accent2">
+                  <a:lumMod val="75000"/>
+                </a:schemeClr>
+              </a:solidFill>
+              <a:latin typeface="Songti SC" panose="02010600040101010101" pitchFamily="2" charset="-122"/>
+              <a:ea typeface="Songti SC" panose="02010600040101010101" pitchFamily="2" charset="-122"/>
+            </a:endParaRPr>
+          </a:p>
+        </p:txBody>
+      </p:sp>
+      <p:sp>
+        <p:nvSpPr>
+          <p:cNvPr id="7" name="矩形 6">
+            <a:extLst>
+              <a:ext uri="{FF2B5EF4-FFF2-40B4-BE49-F238E27FC236}">
+                <a16:creationId xmlns:a16="http://schemas.microsoft.com/office/drawing/2014/main" id="{EC4A8E3E-4C3F-A64E-889D-B9F236F45A6E}"/>
+              </a:ext>
+            </a:extLst>
+          </p:cNvPr>
+          <p:cNvSpPr/>
+          <p:nvPr/>
+        </p:nvSpPr>
+        <p:spPr>
+          <a:xfrm>
+            <a:off x="3702423" y="1954306"/>
+            <a:ext cx="412377" cy="546847"/>
+          </a:xfrm>
+          <a:prstGeom prst="rect">
+            <a:avLst/>
+          </a:prstGeom>
+          <a:noFill/>
+          <a:ln w="9525" cap="flat" cmpd="sng" algn="ctr">
+            <a:solidFill>
+              <a:schemeClr val="bg1">
+                <a:lumMod val="85000"/>
+              </a:schemeClr>
+            </a:solidFill>
+            <a:prstDash val="solid"/>
+            <a:round/>
+            <a:headEnd type="none" w="med" len="med"/>
+            <a:tailEnd type="none" w="med" len="med"/>
+          </a:ln>
+        </p:spPr>
+        <p:style>
+          <a:lnRef idx="0">
+            <a:scrgbClr r="0" g="0" b="0"/>
+          </a:lnRef>
+          <a:fillRef idx="0">
+            <a:scrgbClr r="0" g="0" b="0"/>
+          </a:fillRef>
+          <a:effectRef idx="0">
+            <a:scrgbClr r="0" g="0" b="0"/>
+          </a:effectRef>
+          <a:fontRef idx="minor">
+            <a:schemeClr val="accent1"/>
+          </a:fontRef>
+        </p:style>
+        <p:txBody>
+          <a:bodyPr rtlCol="0" anchor="ctr"/>
+          <a:lstStyle/>
+          <a:p>
+            <a:pPr algn="ctr"/>
+            <a:r>
+              <a:rPr kumimoji="1" lang="en-US" altLang="zh-CN" sz="4400" b="1" dirty="0">
+                <a:solidFill>
+                  <a:schemeClr val="accent2">
+                    <a:lumMod val="60000"/>
+                    <a:lumOff val="40000"/>
+                  </a:schemeClr>
+                </a:solidFill>
+                <a:latin typeface="Songti SC" panose="02010600040101010101" pitchFamily="2" charset="-122"/>
+                <a:ea typeface="Songti SC" panose="02010600040101010101" pitchFamily="2" charset="-122"/>
+              </a:rPr>
+              <a:t>3</a:t>
+            </a:r>
+            <a:endParaRPr kumimoji="1" lang="zh-CN" altLang="en-US" sz="4400" b="1" dirty="0">
+              <a:solidFill>
+                <a:schemeClr val="accent2">
+                  <a:lumMod val="60000"/>
+                  <a:lumOff val="40000"/>
+                </a:schemeClr>
+              </a:solidFill>
+              <a:latin typeface="Songti SC" panose="02010600040101010101" pitchFamily="2" charset="-122"/>
+              <a:ea typeface="Songti SC" panose="02010600040101010101" pitchFamily="2" charset="-122"/>
+            </a:endParaRPr>
+          </a:p>
+        </p:txBody>
+      </p:sp>
+      <p:sp>
+        <p:nvSpPr>
+          <p:cNvPr id="8" name="矩形 7">
+            <a:extLst>
+              <a:ext uri="{FF2B5EF4-FFF2-40B4-BE49-F238E27FC236}">
+                <a16:creationId xmlns:a16="http://schemas.microsoft.com/office/drawing/2014/main" id="{FEF2145F-5C37-B945-B573-56ACD1BC562C}"/>
+              </a:ext>
+            </a:extLst>
+          </p:cNvPr>
+          <p:cNvSpPr/>
+          <p:nvPr/>
+        </p:nvSpPr>
+        <p:spPr>
+          <a:xfrm>
+            <a:off x="4518211" y="1954306"/>
+            <a:ext cx="412377" cy="546847"/>
+          </a:xfrm>
+          <a:prstGeom prst="rect">
+            <a:avLst/>
+          </a:prstGeom>
+          <a:noFill/>
+          <a:ln w="9525" cap="flat" cmpd="sng" algn="ctr">
+            <a:solidFill>
+              <a:schemeClr val="bg1">
+                <a:lumMod val="85000"/>
+              </a:schemeClr>
+            </a:solidFill>
+            <a:prstDash val="solid"/>
+            <a:round/>
+            <a:headEnd type="none" w="med" len="med"/>
+            <a:tailEnd type="none" w="med" len="med"/>
+          </a:ln>
+        </p:spPr>
+        <p:style>
+          <a:lnRef idx="0">
+            <a:scrgbClr r="0" g="0" b="0"/>
+          </a:lnRef>
+          <a:fillRef idx="0">
+            <a:scrgbClr r="0" g="0" b="0"/>
+          </a:fillRef>
+          <a:effectRef idx="0">
+            <a:scrgbClr r="0" g="0" b="0"/>
+          </a:effectRef>
+          <a:fontRef idx="minor">
+            <a:schemeClr val="accent1"/>
+          </a:fontRef>
+        </p:style>
+        <p:txBody>
+          <a:bodyPr rtlCol="0" anchor="ctr"/>
+          <a:lstStyle/>
+          <a:p>
+            <a:pPr algn="ctr"/>
+            <a:r>
+              <a:rPr kumimoji="1" lang="en-US" altLang="zh-CN" sz="4400" b="1" dirty="0">
+                <a:solidFill>
+                  <a:schemeClr val="accent2">
+                    <a:lumMod val="20000"/>
+                    <a:lumOff val="80000"/>
+                  </a:schemeClr>
+                </a:solidFill>
+                <a:latin typeface="Songti SC" panose="02010600040101010101" pitchFamily="2" charset="-122"/>
+                <a:ea typeface="Songti SC" panose="02010600040101010101" pitchFamily="2" charset="-122"/>
+              </a:rPr>
+              <a:t>4</a:t>
+            </a:r>
+            <a:endParaRPr kumimoji="1" lang="zh-CN" altLang="en-US" sz="4400" b="1" dirty="0">
+              <a:solidFill>
+                <a:schemeClr val="accent2">
+                  <a:lumMod val="20000"/>
+                  <a:lumOff val="80000"/>
+                </a:schemeClr>
+              </a:solidFill>
+              <a:latin typeface="Songti SC" panose="02010600040101010101" pitchFamily="2" charset="-122"/>
+              <a:ea typeface="Songti SC" panose="02010600040101010101" pitchFamily="2" charset="-122"/>
+            </a:endParaRPr>
+          </a:p>
+        </p:txBody>
+      </p:sp>
+    </p:spTree>
+    <p:extLst>
+      <p:ext uri="{BB962C8B-B14F-4D97-AF65-F5344CB8AC3E}">
+        <p14:creationId xmlns:p14="http://schemas.microsoft.com/office/powerpoint/2010/main" val="3098712097"/>
+      </p:ext>
+    </p:extLst>
+  </p:cSld>
+  <p:clrMapOvr>
+    <a:masterClrMapping/>
+  </p:clrMapOvr>
+</p:sld>
+</file>
+
 <file path=ppt/theme/theme1.xml><?xml version="1.0" encoding="utf-8"?>
 <a:theme xmlns:a="http://schemas.openxmlformats.org/drawingml/2006/main" name="Office 主题​​">
   <a:themeElements>

</xml_diff>

<commit_message>
[done] sort by priority
</commit_message>
<xml_diff>
--- a/docs/design/design-20210219.pptx
+++ b/docs/design/design-20210219.pptx
@@ -3929,8 +3929,8 @@
           </a:prstGeom>
           <a:solidFill>
             <a:schemeClr val="accent2">
-              <a:lumMod val="40000"/>
-              <a:lumOff val="60000"/>
+              <a:lumMod val="20000"/>
+              <a:lumOff val="80000"/>
             </a:schemeClr>
           </a:solidFill>
           <a:ln>

</xml_diff>

<commit_message>
support expire day setting
</commit_message>
<xml_diff>
--- a/docs/design/design-20210219.pptx
+++ b/docs/design/design-20210219.pptx
@@ -9,6 +9,7 @@
     <p:sldId id="257" r:id="rId3"/>
     <p:sldId id="258" r:id="rId4"/>
     <p:sldId id="259" r:id="rId5"/>
+    <p:sldId id="260" r:id="rId6"/>
   </p:sldIdLst>
   <p:sldSz cx="12192000" cy="6858000"/>
   <p:notesSz cx="6858000" cy="9144000"/>
@@ -262,7 +263,7 @@
           <a:p>
             <a:fld id="{D8B5B211-85AB-A647-A53B-842B83506EF8}" type="datetimeFigureOut">
               <a:rPr kumimoji="1" lang="zh-CN" altLang="en-US" smtClean="0"/>
-              <a:t>2021/2/21</a:t>
+              <a:t>2021/9/18</a:t>
             </a:fld>
             <a:endParaRPr kumimoji="1" lang="zh-CN" altLang="en-US"/>
           </a:p>
@@ -460,7 +461,7 @@
           <a:p>
             <a:fld id="{D8B5B211-85AB-A647-A53B-842B83506EF8}" type="datetimeFigureOut">
               <a:rPr kumimoji="1" lang="zh-CN" altLang="en-US" smtClean="0"/>
-              <a:t>2021/2/21</a:t>
+              <a:t>2021/9/18</a:t>
             </a:fld>
             <a:endParaRPr kumimoji="1" lang="zh-CN" altLang="en-US"/>
           </a:p>
@@ -668,7 +669,7 @@
           <a:p>
             <a:fld id="{D8B5B211-85AB-A647-A53B-842B83506EF8}" type="datetimeFigureOut">
               <a:rPr kumimoji="1" lang="zh-CN" altLang="en-US" smtClean="0"/>
-              <a:t>2021/2/21</a:t>
+              <a:t>2021/9/18</a:t>
             </a:fld>
             <a:endParaRPr kumimoji="1" lang="zh-CN" altLang="en-US"/>
           </a:p>
@@ -866,7 +867,7 @@
           <a:p>
             <a:fld id="{D8B5B211-85AB-A647-A53B-842B83506EF8}" type="datetimeFigureOut">
               <a:rPr kumimoji="1" lang="zh-CN" altLang="en-US" smtClean="0"/>
-              <a:t>2021/2/21</a:t>
+              <a:t>2021/9/18</a:t>
             </a:fld>
             <a:endParaRPr kumimoji="1" lang="zh-CN" altLang="en-US"/>
           </a:p>
@@ -1141,7 +1142,7 @@
           <a:p>
             <a:fld id="{D8B5B211-85AB-A647-A53B-842B83506EF8}" type="datetimeFigureOut">
               <a:rPr kumimoji="1" lang="zh-CN" altLang="en-US" smtClean="0"/>
-              <a:t>2021/2/21</a:t>
+              <a:t>2021/9/18</a:t>
             </a:fld>
             <a:endParaRPr kumimoji="1" lang="zh-CN" altLang="en-US"/>
           </a:p>
@@ -1406,7 +1407,7 @@
           <a:p>
             <a:fld id="{D8B5B211-85AB-A647-A53B-842B83506EF8}" type="datetimeFigureOut">
               <a:rPr kumimoji="1" lang="zh-CN" altLang="en-US" smtClean="0"/>
-              <a:t>2021/2/21</a:t>
+              <a:t>2021/9/18</a:t>
             </a:fld>
             <a:endParaRPr kumimoji="1" lang="zh-CN" altLang="en-US"/>
           </a:p>
@@ -1818,7 +1819,7 @@
           <a:p>
             <a:fld id="{D8B5B211-85AB-A647-A53B-842B83506EF8}" type="datetimeFigureOut">
               <a:rPr kumimoji="1" lang="zh-CN" altLang="en-US" smtClean="0"/>
-              <a:t>2021/2/21</a:t>
+              <a:t>2021/9/18</a:t>
             </a:fld>
             <a:endParaRPr kumimoji="1" lang="zh-CN" altLang="en-US"/>
           </a:p>
@@ -1959,7 +1960,7 @@
           <a:p>
             <a:fld id="{D8B5B211-85AB-A647-A53B-842B83506EF8}" type="datetimeFigureOut">
               <a:rPr kumimoji="1" lang="zh-CN" altLang="en-US" smtClean="0"/>
-              <a:t>2021/2/21</a:t>
+              <a:t>2021/9/18</a:t>
             </a:fld>
             <a:endParaRPr kumimoji="1" lang="zh-CN" altLang="en-US"/>
           </a:p>
@@ -2072,7 +2073,7 @@
           <a:p>
             <a:fld id="{D8B5B211-85AB-A647-A53B-842B83506EF8}" type="datetimeFigureOut">
               <a:rPr kumimoji="1" lang="zh-CN" altLang="en-US" smtClean="0"/>
-              <a:t>2021/2/21</a:t>
+              <a:t>2021/9/18</a:t>
             </a:fld>
             <a:endParaRPr kumimoji="1" lang="zh-CN" altLang="en-US"/>
           </a:p>
@@ -2383,7 +2384,7 @@
           <a:p>
             <a:fld id="{D8B5B211-85AB-A647-A53B-842B83506EF8}" type="datetimeFigureOut">
               <a:rPr kumimoji="1" lang="zh-CN" altLang="en-US" smtClean="0"/>
-              <a:t>2021/2/21</a:t>
+              <a:t>2021/9/18</a:t>
             </a:fld>
             <a:endParaRPr kumimoji="1" lang="zh-CN" altLang="en-US"/>
           </a:p>
@@ -2671,7 +2672,7 @@
           <a:p>
             <a:fld id="{D8B5B211-85AB-A647-A53B-842B83506EF8}" type="datetimeFigureOut">
               <a:rPr kumimoji="1" lang="zh-CN" altLang="en-US" smtClean="0"/>
-              <a:t>2021/2/21</a:t>
+              <a:t>2021/9/18</a:t>
             </a:fld>
             <a:endParaRPr kumimoji="1" lang="zh-CN" altLang="en-US"/>
           </a:p>
@@ -2912,7 +2913,7 @@
           <a:p>
             <a:fld id="{D8B5B211-85AB-A647-A53B-842B83506EF8}" type="datetimeFigureOut">
               <a:rPr kumimoji="1" lang="zh-CN" altLang="en-US" smtClean="0"/>
-              <a:t>2021/2/21</a:t>
+              <a:t>2021/9/18</a:t>
             </a:fld>
             <a:endParaRPr kumimoji="1" lang="zh-CN" altLang="en-US"/>
           </a:p>
@@ -4315,6 +4316,102 @@
 </p:sld>
 </file>
 
+<file path=ppt/slides/slide5.xml><?xml version="1.0" encoding="utf-8"?>
+<p:sld xmlns:a="http://schemas.openxmlformats.org/drawingml/2006/main" xmlns:r="http://schemas.openxmlformats.org/officeDocument/2006/relationships" xmlns:p="http://schemas.openxmlformats.org/presentationml/2006/main">
+  <p:cSld>
+    <p:spTree>
+      <p:nvGrpSpPr>
+        <p:cNvPr id="1" name=""/>
+        <p:cNvGrpSpPr/>
+        <p:nvPr/>
+      </p:nvGrpSpPr>
+      <p:grpSpPr>
+        <a:xfrm>
+          <a:off x="0" y="0"/>
+          <a:ext cx="0" cy="0"/>
+          <a:chOff x="0" y="0"/>
+          <a:chExt cx="0" cy="0"/>
+        </a:xfrm>
+      </p:grpSpPr>
+      <p:pic>
+        <p:nvPicPr>
+          <p:cNvPr id="1026" name="Picture 2" descr="Computer Icons, Free Remove Icon, symbol, red png | PNGEgg">
+            <a:extLst>
+              <a:ext uri="{FF2B5EF4-FFF2-40B4-BE49-F238E27FC236}">
+                <a16:creationId xmlns:a16="http://schemas.microsoft.com/office/drawing/2014/main" id="{9E4D0E60-E0CF-1440-AE66-AA2806997B92}"/>
+              </a:ext>
+            </a:extLst>
+          </p:cNvPr>
+          <p:cNvPicPr>
+            <a:picLocks noChangeAspect="1" noChangeArrowheads="1"/>
+          </p:cNvPicPr>
+          <p:nvPr/>
+        </p:nvPicPr>
+        <p:blipFill>
+          <a:blip r:embed="rId2">
+            <a:extLst>
+              <a:ext uri="{BEBA8EAE-BF5A-486C-A8C5-ECC9F3942E4B}">
+                <a14:imgProps xmlns:a14="http://schemas.microsoft.com/office/drawing/2010/main">
+                  <a14:imgLayer r:embed="rId3">
+                    <a14:imgEffect>
+                      <a14:backgroundRemoval t="3556" b="97778" l="2667" r="96000">
+                        <a14:foregroundMark x1="13333" y1="8444" x2="13333" y2="8444"/>
+                        <a14:foregroundMark x1="11556" y1="6667" x2="11556" y2="6667"/>
+                        <a14:foregroundMark x1="3111" y1="8000" x2="3111" y2="8000"/>
+                        <a14:foregroundMark x1="8889" y1="3556" x2="8889" y2="3556"/>
+                        <a14:foregroundMark x1="93778" y1="5333" x2="93778" y2="5333"/>
+                        <a14:foregroundMark x1="7556" y1="94667" x2="7556" y2="94667"/>
+                        <a14:foregroundMark x1="94667" y1="94667" x2="94667" y2="94667"/>
+                        <a14:foregroundMark x1="96000" y1="97778" x2="96000" y2="97778"/>
+                        <a14:foregroundMark x1="3111" y1="88000" x2="3111" y2="88000"/>
+                      </a14:backgroundRemoval>
+                    </a14:imgEffect>
+                  </a14:imgLayer>
+                </a14:imgProps>
+              </a:ext>
+              <a:ext uri="{28A0092B-C50C-407E-A947-70E740481C1C}">
+                <a14:useLocalDpi xmlns:a14="http://schemas.microsoft.com/office/drawing/2010/main" val="0"/>
+              </a:ext>
+            </a:extLst>
+          </a:blip>
+          <a:srcRect/>
+          <a:stretch>
+            <a:fillRect/>
+          </a:stretch>
+        </p:blipFill>
+        <p:spPr bwMode="auto">
+          <a:xfrm>
+            <a:off x="4667250" y="2000250"/>
+            <a:ext cx="553764" cy="553764"/>
+          </a:xfrm>
+          <a:prstGeom prst="rect">
+            <a:avLst/>
+          </a:prstGeom>
+          <a:noFill/>
+          <a:extLst>
+            <a:ext uri="{909E8E84-426E-40DD-AFC4-6F175D3DCCD1}">
+              <a14:hiddenFill xmlns:a14="http://schemas.microsoft.com/office/drawing/2010/main">
+                <a:solidFill>
+                  <a:srgbClr val="FFFFFF"/>
+                </a:solidFill>
+              </a14:hiddenFill>
+            </a:ext>
+          </a:extLst>
+        </p:spPr>
+      </p:pic>
+    </p:spTree>
+    <p:extLst>
+      <p:ext uri="{BB962C8B-B14F-4D97-AF65-F5344CB8AC3E}">
+        <p14:creationId xmlns:p14="http://schemas.microsoft.com/office/powerpoint/2010/main" val="3738286337"/>
+      </p:ext>
+    </p:extLst>
+  </p:cSld>
+  <p:clrMapOvr>
+    <a:masterClrMapping/>
+  </p:clrMapOvr>
+</p:sld>
+</file>
+
 <file path=ppt/theme/theme1.xml><?xml version="1.0" encoding="utf-8"?>
 <a:theme xmlns:a="http://schemas.openxmlformats.org/drawingml/2006/main" name="Office 主题​​">
   <a:themeElements>

</xml_diff>

<commit_message>
[FLAKE-15][Today] Add today panel
</commit_message>
<xml_diff>
--- a/docs/design/design-20210219.pptx
+++ b/docs/design/design-20210219.pptx
@@ -4,11 +4,25 @@
   <p:sldMasterIdLst>
     <p:sldMasterId id="2147483648" r:id="rId1"/>
   </p:sldMasterIdLst>
+  <p:notesMasterIdLst>
+    <p:notesMasterId r:id="rId17"/>
+  </p:notesMasterIdLst>
   <p:sldIdLst>
     <p:sldId id="256" r:id="rId2"/>
     <p:sldId id="257" r:id="rId3"/>
     <p:sldId id="258" r:id="rId4"/>
     <p:sldId id="259" r:id="rId5"/>
+    <p:sldId id="260" r:id="rId6"/>
+    <p:sldId id="261" r:id="rId7"/>
+    <p:sldId id="262" r:id="rId8"/>
+    <p:sldId id="263" r:id="rId9"/>
+    <p:sldId id="264" r:id="rId10"/>
+    <p:sldId id="265" r:id="rId11"/>
+    <p:sldId id="266" r:id="rId12"/>
+    <p:sldId id="267" r:id="rId13"/>
+    <p:sldId id="268" r:id="rId14"/>
+    <p:sldId id="269" r:id="rId15"/>
+    <p:sldId id="270" r:id="rId16"/>
   </p:sldIdLst>
   <p:sldSz cx="12192000" cy="6858000"/>
   <p:notesSz cx="6858000" cy="9144000"/>
@@ -115,6 +129,439 @@
 </p:presentation>
 </file>
 
+<file path=ppt/notesMasters/notesMaster1.xml><?xml version="1.0" encoding="utf-8"?>
+<p:notesMaster xmlns:a="http://schemas.openxmlformats.org/drawingml/2006/main" xmlns:r="http://schemas.openxmlformats.org/officeDocument/2006/relationships" xmlns:p="http://schemas.openxmlformats.org/presentationml/2006/main">
+  <p:cSld>
+    <p:bg>
+      <p:bgRef idx="1001">
+        <a:schemeClr val="bg1"/>
+      </p:bgRef>
+    </p:bg>
+    <p:spTree>
+      <p:nvGrpSpPr>
+        <p:cNvPr id="1" name=""/>
+        <p:cNvGrpSpPr/>
+        <p:nvPr/>
+      </p:nvGrpSpPr>
+      <p:grpSpPr>
+        <a:xfrm>
+          <a:off x="0" y="0"/>
+          <a:ext cx="0" cy="0"/>
+          <a:chOff x="0" y="0"/>
+          <a:chExt cx="0" cy="0"/>
+        </a:xfrm>
+      </p:grpSpPr>
+      <p:sp>
+        <p:nvSpPr>
+          <p:cNvPr id="2" name="页眉占位符 1"/>
+          <p:cNvSpPr>
+            <a:spLocks noGrp="1"/>
+          </p:cNvSpPr>
+          <p:nvPr>
+            <p:ph type="hdr" sz="quarter"/>
+          </p:nvPr>
+        </p:nvSpPr>
+        <p:spPr>
+          <a:xfrm>
+            <a:off x="0" y="0"/>
+            <a:ext cx="2971800" cy="458788"/>
+          </a:xfrm>
+          <a:prstGeom prst="rect">
+            <a:avLst/>
+          </a:prstGeom>
+        </p:spPr>
+        <p:txBody>
+          <a:bodyPr vert="horz" lIns="91440" tIns="45720" rIns="91440" bIns="45720" rtlCol="0"/>
+          <a:lstStyle>
+            <a:lvl1pPr algn="l">
+              <a:defRPr sz="1200"/>
+            </a:lvl1pPr>
+          </a:lstStyle>
+          <a:p>
+            <a:endParaRPr kumimoji="1" lang="zh-CN" altLang="en-US"/>
+          </a:p>
+        </p:txBody>
+      </p:sp>
+      <p:sp>
+        <p:nvSpPr>
+          <p:cNvPr id="3" name="日期占位符 2"/>
+          <p:cNvSpPr>
+            <a:spLocks noGrp="1"/>
+          </p:cNvSpPr>
+          <p:nvPr>
+            <p:ph type="dt" idx="1"/>
+          </p:nvPr>
+        </p:nvSpPr>
+        <p:spPr>
+          <a:xfrm>
+            <a:off x="3884613" y="0"/>
+            <a:ext cx="2971800" cy="458788"/>
+          </a:xfrm>
+          <a:prstGeom prst="rect">
+            <a:avLst/>
+          </a:prstGeom>
+        </p:spPr>
+        <p:txBody>
+          <a:bodyPr vert="horz" lIns="91440" tIns="45720" rIns="91440" bIns="45720" rtlCol="0"/>
+          <a:lstStyle>
+            <a:lvl1pPr algn="r">
+              <a:defRPr sz="1200"/>
+            </a:lvl1pPr>
+          </a:lstStyle>
+          <a:p>
+            <a:fld id="{7D3EAA0C-4EAE-A741-B890-13DE5663034C}" type="datetimeFigureOut">
+              <a:rPr kumimoji="1" lang="zh-CN" altLang="en-US" smtClean="0"/>
+              <a:t>2023/4/30</a:t>
+            </a:fld>
+            <a:endParaRPr kumimoji="1" lang="zh-CN" altLang="en-US"/>
+          </a:p>
+        </p:txBody>
+      </p:sp>
+      <p:sp>
+        <p:nvSpPr>
+          <p:cNvPr id="4" name="幻灯片图像占位符 3"/>
+          <p:cNvSpPr>
+            <a:spLocks noGrp="1" noRot="1" noChangeAspect="1"/>
+          </p:cNvSpPr>
+          <p:nvPr>
+            <p:ph type="sldImg" idx="2"/>
+          </p:nvPr>
+        </p:nvSpPr>
+        <p:spPr>
+          <a:xfrm>
+            <a:off x="685800" y="1143000"/>
+            <a:ext cx="5486400" cy="3086100"/>
+          </a:xfrm>
+          <a:prstGeom prst="rect">
+            <a:avLst/>
+          </a:prstGeom>
+          <a:noFill/>
+          <a:ln w="12700">
+            <a:solidFill>
+              <a:prstClr val="black"/>
+            </a:solidFill>
+          </a:ln>
+        </p:spPr>
+        <p:txBody>
+          <a:bodyPr vert="horz" lIns="91440" tIns="45720" rIns="91440" bIns="45720" rtlCol="0" anchor="ctr"/>
+          <a:lstStyle/>
+          <a:p>
+            <a:endParaRPr lang="zh-CN" altLang="en-US"/>
+          </a:p>
+        </p:txBody>
+      </p:sp>
+      <p:sp>
+        <p:nvSpPr>
+          <p:cNvPr id="5" name="备注占位符 4"/>
+          <p:cNvSpPr>
+            <a:spLocks noGrp="1"/>
+          </p:cNvSpPr>
+          <p:nvPr>
+            <p:ph type="body" sz="quarter" idx="3"/>
+          </p:nvPr>
+        </p:nvSpPr>
+        <p:spPr>
+          <a:xfrm>
+            <a:off x="685800" y="4400550"/>
+            <a:ext cx="5486400" cy="3600450"/>
+          </a:xfrm>
+          <a:prstGeom prst="rect">
+            <a:avLst/>
+          </a:prstGeom>
+        </p:spPr>
+        <p:txBody>
+          <a:bodyPr vert="horz" lIns="91440" tIns="45720" rIns="91440" bIns="45720" rtlCol="0"/>
+          <a:lstStyle/>
+          <a:p>
+            <a:pPr lvl="0"/>
+            <a:r>
+              <a:rPr kumimoji="1" lang="zh-CN" altLang="en-US"/>
+              <a:t>单击此处编辑母版文本样式</a:t>
+            </a:r>
+          </a:p>
+          <a:p>
+            <a:pPr lvl="1"/>
+            <a:r>
+              <a:rPr kumimoji="1" lang="zh-CN" altLang="en-US"/>
+              <a:t>二级</a:t>
+            </a:r>
+          </a:p>
+          <a:p>
+            <a:pPr lvl="2"/>
+            <a:r>
+              <a:rPr kumimoji="1" lang="zh-CN" altLang="en-US"/>
+              <a:t>三级</a:t>
+            </a:r>
+          </a:p>
+          <a:p>
+            <a:pPr lvl="3"/>
+            <a:r>
+              <a:rPr kumimoji="1" lang="zh-CN" altLang="en-US"/>
+              <a:t>四级</a:t>
+            </a:r>
+          </a:p>
+          <a:p>
+            <a:pPr lvl="4"/>
+            <a:r>
+              <a:rPr kumimoji="1" lang="zh-CN" altLang="en-US"/>
+              <a:t>五级</a:t>
+            </a:r>
+          </a:p>
+        </p:txBody>
+      </p:sp>
+      <p:sp>
+        <p:nvSpPr>
+          <p:cNvPr id="6" name="页脚占位符 5"/>
+          <p:cNvSpPr>
+            <a:spLocks noGrp="1"/>
+          </p:cNvSpPr>
+          <p:nvPr>
+            <p:ph type="ftr" sz="quarter" idx="4"/>
+          </p:nvPr>
+        </p:nvSpPr>
+        <p:spPr>
+          <a:xfrm>
+            <a:off x="0" y="8685213"/>
+            <a:ext cx="2971800" cy="458787"/>
+          </a:xfrm>
+          <a:prstGeom prst="rect">
+            <a:avLst/>
+          </a:prstGeom>
+        </p:spPr>
+        <p:txBody>
+          <a:bodyPr vert="horz" lIns="91440" tIns="45720" rIns="91440" bIns="45720" rtlCol="0" anchor="b"/>
+          <a:lstStyle>
+            <a:lvl1pPr algn="l">
+              <a:defRPr sz="1200"/>
+            </a:lvl1pPr>
+          </a:lstStyle>
+          <a:p>
+            <a:endParaRPr kumimoji="1" lang="zh-CN" altLang="en-US"/>
+          </a:p>
+        </p:txBody>
+      </p:sp>
+      <p:sp>
+        <p:nvSpPr>
+          <p:cNvPr id="7" name="灯片编号占位符 6"/>
+          <p:cNvSpPr>
+            <a:spLocks noGrp="1"/>
+          </p:cNvSpPr>
+          <p:nvPr>
+            <p:ph type="sldNum" sz="quarter" idx="5"/>
+          </p:nvPr>
+        </p:nvSpPr>
+        <p:spPr>
+          <a:xfrm>
+            <a:off x="3884613" y="8685213"/>
+            <a:ext cx="2971800" cy="458787"/>
+          </a:xfrm>
+          <a:prstGeom prst="rect">
+            <a:avLst/>
+          </a:prstGeom>
+        </p:spPr>
+        <p:txBody>
+          <a:bodyPr vert="horz" lIns="91440" tIns="45720" rIns="91440" bIns="45720" rtlCol="0" anchor="b"/>
+          <a:lstStyle>
+            <a:lvl1pPr algn="r">
+              <a:defRPr sz="1200"/>
+            </a:lvl1pPr>
+          </a:lstStyle>
+          <a:p>
+            <a:fld id="{E6C502F6-1C0B-9A46-A9EF-01BFA37B2353}" type="slidenum">
+              <a:rPr kumimoji="1" lang="zh-CN" altLang="en-US" smtClean="0"/>
+              <a:t>‹#›</a:t>
+            </a:fld>
+            <a:endParaRPr kumimoji="1" lang="zh-CN" altLang="en-US"/>
+          </a:p>
+        </p:txBody>
+      </p:sp>
+    </p:spTree>
+    <p:extLst>
+      <p:ext uri="{BB962C8B-B14F-4D97-AF65-F5344CB8AC3E}">
+        <p14:creationId xmlns:p14="http://schemas.microsoft.com/office/powerpoint/2010/main" val="1779559317"/>
+      </p:ext>
+    </p:extLst>
+  </p:cSld>
+  <p:clrMap bg1="lt1" tx1="dk1" bg2="lt2" tx2="dk2" accent1="accent1" accent2="accent2" accent3="accent3" accent4="accent4" accent5="accent5" accent6="accent6" hlink="hlink" folHlink="folHlink"/>
+  <p:notesStyle>
+    <a:lvl1pPr marL="0" algn="l" defTabSz="914400" rtl="0" eaLnBrk="1" latinLnBrk="0" hangingPunct="1">
+      <a:defRPr sz="1200" kern="1200">
+        <a:solidFill>
+          <a:schemeClr val="tx1"/>
+        </a:solidFill>
+        <a:latin typeface="+mn-lt"/>
+        <a:ea typeface="+mn-ea"/>
+        <a:cs typeface="+mn-cs"/>
+      </a:defRPr>
+    </a:lvl1pPr>
+    <a:lvl2pPr marL="457200" algn="l" defTabSz="914400" rtl="0" eaLnBrk="1" latinLnBrk="0" hangingPunct="1">
+      <a:defRPr sz="1200" kern="1200">
+        <a:solidFill>
+          <a:schemeClr val="tx1"/>
+        </a:solidFill>
+        <a:latin typeface="+mn-lt"/>
+        <a:ea typeface="+mn-ea"/>
+        <a:cs typeface="+mn-cs"/>
+      </a:defRPr>
+    </a:lvl2pPr>
+    <a:lvl3pPr marL="914400" algn="l" defTabSz="914400" rtl="0" eaLnBrk="1" latinLnBrk="0" hangingPunct="1">
+      <a:defRPr sz="1200" kern="1200">
+        <a:solidFill>
+          <a:schemeClr val="tx1"/>
+        </a:solidFill>
+        <a:latin typeface="+mn-lt"/>
+        <a:ea typeface="+mn-ea"/>
+        <a:cs typeface="+mn-cs"/>
+      </a:defRPr>
+    </a:lvl3pPr>
+    <a:lvl4pPr marL="1371600" algn="l" defTabSz="914400" rtl="0" eaLnBrk="1" latinLnBrk="0" hangingPunct="1">
+      <a:defRPr sz="1200" kern="1200">
+        <a:solidFill>
+          <a:schemeClr val="tx1"/>
+        </a:solidFill>
+        <a:latin typeface="+mn-lt"/>
+        <a:ea typeface="+mn-ea"/>
+        <a:cs typeface="+mn-cs"/>
+      </a:defRPr>
+    </a:lvl4pPr>
+    <a:lvl5pPr marL="1828800" algn="l" defTabSz="914400" rtl="0" eaLnBrk="1" latinLnBrk="0" hangingPunct="1">
+      <a:defRPr sz="1200" kern="1200">
+        <a:solidFill>
+          <a:schemeClr val="tx1"/>
+        </a:solidFill>
+        <a:latin typeface="+mn-lt"/>
+        <a:ea typeface="+mn-ea"/>
+        <a:cs typeface="+mn-cs"/>
+      </a:defRPr>
+    </a:lvl5pPr>
+    <a:lvl6pPr marL="2286000" algn="l" defTabSz="914400" rtl="0" eaLnBrk="1" latinLnBrk="0" hangingPunct="1">
+      <a:defRPr sz="1200" kern="1200">
+        <a:solidFill>
+          <a:schemeClr val="tx1"/>
+        </a:solidFill>
+        <a:latin typeface="+mn-lt"/>
+        <a:ea typeface="+mn-ea"/>
+        <a:cs typeface="+mn-cs"/>
+      </a:defRPr>
+    </a:lvl6pPr>
+    <a:lvl7pPr marL="2743200" algn="l" defTabSz="914400" rtl="0" eaLnBrk="1" latinLnBrk="0" hangingPunct="1">
+      <a:defRPr sz="1200" kern="1200">
+        <a:solidFill>
+          <a:schemeClr val="tx1"/>
+        </a:solidFill>
+        <a:latin typeface="+mn-lt"/>
+        <a:ea typeface="+mn-ea"/>
+        <a:cs typeface="+mn-cs"/>
+      </a:defRPr>
+    </a:lvl7pPr>
+    <a:lvl8pPr marL="3200400" algn="l" defTabSz="914400" rtl="0" eaLnBrk="1" latinLnBrk="0" hangingPunct="1">
+      <a:defRPr sz="1200" kern="1200">
+        <a:solidFill>
+          <a:schemeClr val="tx1"/>
+        </a:solidFill>
+        <a:latin typeface="+mn-lt"/>
+        <a:ea typeface="+mn-ea"/>
+        <a:cs typeface="+mn-cs"/>
+      </a:defRPr>
+    </a:lvl8pPr>
+    <a:lvl9pPr marL="3657600" algn="l" defTabSz="914400" rtl="0" eaLnBrk="1" latinLnBrk="0" hangingPunct="1">
+      <a:defRPr sz="1200" kern="1200">
+        <a:solidFill>
+          <a:schemeClr val="tx1"/>
+        </a:solidFill>
+        <a:latin typeface="+mn-lt"/>
+        <a:ea typeface="+mn-ea"/>
+        <a:cs typeface="+mn-cs"/>
+      </a:defRPr>
+    </a:lvl9pPr>
+  </p:notesStyle>
+</p:notesMaster>
+</file>
+
+<file path=ppt/notesSlides/notesSlide1.xml><?xml version="1.0" encoding="utf-8"?>
+<p:notes xmlns:a="http://schemas.openxmlformats.org/drawingml/2006/main" xmlns:r="http://schemas.openxmlformats.org/officeDocument/2006/relationships" xmlns:p="http://schemas.openxmlformats.org/presentationml/2006/main">
+  <p:cSld>
+    <p:spTree>
+      <p:nvGrpSpPr>
+        <p:cNvPr id="1" name=""/>
+        <p:cNvGrpSpPr/>
+        <p:nvPr/>
+      </p:nvGrpSpPr>
+      <p:grpSpPr>
+        <a:xfrm>
+          <a:off x="0" y="0"/>
+          <a:ext cx="0" cy="0"/>
+          <a:chOff x="0" y="0"/>
+          <a:chExt cx="0" cy="0"/>
+        </a:xfrm>
+      </p:grpSpPr>
+      <p:sp>
+        <p:nvSpPr>
+          <p:cNvPr id="2" name="幻灯片图像占位符 1"/>
+          <p:cNvSpPr>
+            <a:spLocks noGrp="1" noRot="1" noChangeAspect="1"/>
+          </p:cNvSpPr>
+          <p:nvPr>
+            <p:ph type="sldImg"/>
+          </p:nvPr>
+        </p:nvSpPr>
+        <p:spPr/>
+      </p:sp>
+      <p:sp>
+        <p:nvSpPr>
+          <p:cNvPr id="3" name="备注占位符 2"/>
+          <p:cNvSpPr>
+            <a:spLocks noGrp="1"/>
+          </p:cNvSpPr>
+          <p:nvPr>
+            <p:ph type="body" idx="1"/>
+          </p:nvPr>
+        </p:nvSpPr>
+        <p:spPr/>
+        <p:txBody>
+          <a:bodyPr/>
+          <a:lstStyle/>
+          <a:p>
+            <a:endParaRPr kumimoji="1" lang="zh-CN" altLang="en-US" dirty="0"/>
+          </a:p>
+        </p:txBody>
+      </p:sp>
+      <p:sp>
+        <p:nvSpPr>
+          <p:cNvPr id="4" name="灯片编号占位符 3"/>
+          <p:cNvSpPr>
+            <a:spLocks noGrp="1"/>
+          </p:cNvSpPr>
+          <p:nvPr>
+            <p:ph type="sldNum" sz="quarter" idx="5"/>
+          </p:nvPr>
+        </p:nvSpPr>
+        <p:spPr/>
+        <p:txBody>
+          <a:bodyPr/>
+          <a:lstStyle/>
+          <a:p>
+            <a:fld id="{E6C502F6-1C0B-9A46-A9EF-01BFA37B2353}" type="slidenum">
+              <a:rPr kumimoji="1" lang="zh-CN" altLang="en-US" smtClean="0"/>
+              <a:t>15</a:t>
+            </a:fld>
+            <a:endParaRPr kumimoji="1" lang="zh-CN" altLang="en-US"/>
+          </a:p>
+        </p:txBody>
+      </p:sp>
+    </p:spTree>
+    <p:extLst>
+      <p:ext uri="{BB962C8B-B14F-4D97-AF65-F5344CB8AC3E}">
+        <p14:creationId xmlns:p14="http://schemas.microsoft.com/office/powerpoint/2010/main" val="1737037147"/>
+      </p:ext>
+    </p:extLst>
+  </p:cSld>
+  <p:clrMapOvr>
+    <a:masterClrMapping/>
+  </p:clrMapOvr>
+</p:notes>
+</file>
+
 <file path=ppt/slideLayouts/slideLayout1.xml><?xml version="1.0" encoding="utf-8"?>
 <p:sldLayout xmlns:a="http://schemas.openxmlformats.org/drawingml/2006/main" xmlns:r="http://schemas.openxmlformats.org/officeDocument/2006/relationships" xmlns:p="http://schemas.openxmlformats.org/presentationml/2006/main" type="title" preserve="1">
   <p:cSld name="标题幻灯片">
@@ -262,7 +709,7 @@
           <a:p>
             <a:fld id="{D8B5B211-85AB-A647-A53B-842B83506EF8}" type="datetimeFigureOut">
               <a:rPr kumimoji="1" lang="zh-CN" altLang="en-US" smtClean="0"/>
-              <a:t>2021/2/21</a:t>
+              <a:t>2023/4/30</a:t>
             </a:fld>
             <a:endParaRPr kumimoji="1" lang="zh-CN" altLang="en-US"/>
           </a:p>
@@ -460,7 +907,7 @@
           <a:p>
             <a:fld id="{D8B5B211-85AB-A647-A53B-842B83506EF8}" type="datetimeFigureOut">
               <a:rPr kumimoji="1" lang="zh-CN" altLang="en-US" smtClean="0"/>
-              <a:t>2021/2/21</a:t>
+              <a:t>2023/4/30</a:t>
             </a:fld>
             <a:endParaRPr kumimoji="1" lang="zh-CN" altLang="en-US"/>
           </a:p>
@@ -668,7 +1115,7 @@
           <a:p>
             <a:fld id="{D8B5B211-85AB-A647-A53B-842B83506EF8}" type="datetimeFigureOut">
               <a:rPr kumimoji="1" lang="zh-CN" altLang="en-US" smtClean="0"/>
-              <a:t>2021/2/21</a:t>
+              <a:t>2023/4/30</a:t>
             </a:fld>
             <a:endParaRPr kumimoji="1" lang="zh-CN" altLang="en-US"/>
           </a:p>
@@ -866,7 +1313,7 @@
           <a:p>
             <a:fld id="{D8B5B211-85AB-A647-A53B-842B83506EF8}" type="datetimeFigureOut">
               <a:rPr kumimoji="1" lang="zh-CN" altLang="en-US" smtClean="0"/>
-              <a:t>2021/2/21</a:t>
+              <a:t>2023/4/30</a:t>
             </a:fld>
             <a:endParaRPr kumimoji="1" lang="zh-CN" altLang="en-US"/>
           </a:p>
@@ -1141,7 +1588,7 @@
           <a:p>
             <a:fld id="{D8B5B211-85AB-A647-A53B-842B83506EF8}" type="datetimeFigureOut">
               <a:rPr kumimoji="1" lang="zh-CN" altLang="en-US" smtClean="0"/>
-              <a:t>2021/2/21</a:t>
+              <a:t>2023/4/30</a:t>
             </a:fld>
             <a:endParaRPr kumimoji="1" lang="zh-CN" altLang="en-US"/>
           </a:p>
@@ -1406,7 +1853,7 @@
           <a:p>
             <a:fld id="{D8B5B211-85AB-A647-A53B-842B83506EF8}" type="datetimeFigureOut">
               <a:rPr kumimoji="1" lang="zh-CN" altLang="en-US" smtClean="0"/>
-              <a:t>2021/2/21</a:t>
+              <a:t>2023/4/30</a:t>
             </a:fld>
             <a:endParaRPr kumimoji="1" lang="zh-CN" altLang="en-US"/>
           </a:p>
@@ -1818,7 +2265,7 @@
           <a:p>
             <a:fld id="{D8B5B211-85AB-A647-A53B-842B83506EF8}" type="datetimeFigureOut">
               <a:rPr kumimoji="1" lang="zh-CN" altLang="en-US" smtClean="0"/>
-              <a:t>2021/2/21</a:t>
+              <a:t>2023/4/30</a:t>
             </a:fld>
             <a:endParaRPr kumimoji="1" lang="zh-CN" altLang="en-US"/>
           </a:p>
@@ -1959,7 +2406,7 @@
           <a:p>
             <a:fld id="{D8B5B211-85AB-A647-A53B-842B83506EF8}" type="datetimeFigureOut">
               <a:rPr kumimoji="1" lang="zh-CN" altLang="en-US" smtClean="0"/>
-              <a:t>2021/2/21</a:t>
+              <a:t>2023/4/30</a:t>
             </a:fld>
             <a:endParaRPr kumimoji="1" lang="zh-CN" altLang="en-US"/>
           </a:p>
@@ -2072,7 +2519,7 @@
           <a:p>
             <a:fld id="{D8B5B211-85AB-A647-A53B-842B83506EF8}" type="datetimeFigureOut">
               <a:rPr kumimoji="1" lang="zh-CN" altLang="en-US" smtClean="0"/>
-              <a:t>2021/2/21</a:t>
+              <a:t>2023/4/30</a:t>
             </a:fld>
             <a:endParaRPr kumimoji="1" lang="zh-CN" altLang="en-US"/>
           </a:p>
@@ -2383,7 +2830,7 @@
           <a:p>
             <a:fld id="{D8B5B211-85AB-A647-A53B-842B83506EF8}" type="datetimeFigureOut">
               <a:rPr kumimoji="1" lang="zh-CN" altLang="en-US" smtClean="0"/>
-              <a:t>2021/2/21</a:t>
+              <a:t>2023/4/30</a:t>
             </a:fld>
             <a:endParaRPr kumimoji="1" lang="zh-CN" altLang="en-US"/>
           </a:p>
@@ -2671,7 +3118,7 @@
           <a:p>
             <a:fld id="{D8B5B211-85AB-A647-A53B-842B83506EF8}" type="datetimeFigureOut">
               <a:rPr kumimoji="1" lang="zh-CN" altLang="en-US" smtClean="0"/>
-              <a:t>2021/2/21</a:t>
+              <a:t>2023/4/30</a:t>
             </a:fld>
             <a:endParaRPr kumimoji="1" lang="zh-CN" altLang="en-US"/>
           </a:p>
@@ -2912,7 +3359,7 @@
           <a:p>
             <a:fld id="{D8B5B211-85AB-A647-A53B-842B83506EF8}" type="datetimeFigureOut">
               <a:rPr kumimoji="1" lang="zh-CN" altLang="en-US" smtClean="0"/>
-              <a:t>2021/2/21</a:t>
+              <a:t>2023/4/30</a:t>
             </a:fld>
             <a:endParaRPr kumimoji="1" lang="zh-CN" altLang="en-US"/>
           </a:p>
@@ -3419,6 +3866,705 @@
 </p:sld>
 </file>
 
+<file path=ppt/slides/slide10.xml><?xml version="1.0" encoding="utf-8"?>
+<p:sld xmlns:a="http://schemas.openxmlformats.org/drawingml/2006/main" xmlns:r="http://schemas.openxmlformats.org/officeDocument/2006/relationships" xmlns:p="http://schemas.openxmlformats.org/presentationml/2006/main">
+  <p:cSld>
+    <p:spTree>
+      <p:nvGrpSpPr>
+        <p:cNvPr id="1" name=""/>
+        <p:cNvGrpSpPr/>
+        <p:nvPr/>
+      </p:nvGrpSpPr>
+      <p:grpSpPr>
+        <a:xfrm>
+          <a:off x="0" y="0"/>
+          <a:ext cx="0" cy="0"/>
+          <a:chOff x="0" y="0"/>
+          <a:chExt cx="0" cy="0"/>
+        </a:xfrm>
+      </p:grpSpPr>
+      <p:pic>
+        <p:nvPicPr>
+          <p:cNvPr id="6146" name="Picture 2">
+            <a:extLst>
+              <a:ext uri="{FF2B5EF4-FFF2-40B4-BE49-F238E27FC236}">
+                <a16:creationId xmlns:a16="http://schemas.microsoft.com/office/drawing/2014/main" id="{511A0EB2-C7F7-65EB-8F4D-027D22A9BCA4}"/>
+              </a:ext>
+            </a:extLst>
+          </p:cNvPr>
+          <p:cNvPicPr>
+            <a:picLocks noChangeAspect="1" noChangeArrowheads="1"/>
+          </p:cNvPicPr>
+          <p:nvPr/>
+        </p:nvPicPr>
+        <p:blipFill rotWithShape="1">
+          <a:blip r:embed="rId2">
+            <a:extLst>
+              <a:ext uri="{28A0092B-C50C-407E-A947-70E740481C1C}">
+                <a14:useLocalDpi xmlns:a14="http://schemas.microsoft.com/office/drawing/2010/main" val="0"/>
+              </a:ext>
+            </a:extLst>
+          </a:blip>
+          <a:srcRect l="3877" t="9931" r="3731" b="8841"/>
+          <a:stretch/>
+        </p:blipFill>
+        <p:spPr bwMode="auto">
+          <a:xfrm>
+            <a:off x="695740" y="0"/>
+            <a:ext cx="10400562" cy="6858000"/>
+          </a:xfrm>
+          <a:prstGeom prst="rect">
+            <a:avLst/>
+          </a:prstGeom>
+          <a:noFill/>
+          <a:extLst>
+            <a:ext uri="{909E8E84-426E-40DD-AFC4-6F175D3DCCD1}">
+              <a14:hiddenFill xmlns:a14="http://schemas.microsoft.com/office/drawing/2010/main">
+                <a:solidFill>
+                  <a:srgbClr val="FFFFFF"/>
+                </a:solidFill>
+              </a14:hiddenFill>
+            </a:ext>
+          </a:extLst>
+        </p:spPr>
+      </p:pic>
+    </p:spTree>
+    <p:extLst>
+      <p:ext uri="{BB962C8B-B14F-4D97-AF65-F5344CB8AC3E}">
+        <p14:creationId xmlns:p14="http://schemas.microsoft.com/office/powerpoint/2010/main" val="1359064443"/>
+      </p:ext>
+    </p:extLst>
+  </p:cSld>
+  <p:clrMapOvr>
+    <a:masterClrMapping/>
+  </p:clrMapOvr>
+</p:sld>
+</file>
+
+<file path=ppt/slides/slide11.xml><?xml version="1.0" encoding="utf-8"?>
+<p:sld xmlns:a="http://schemas.openxmlformats.org/drawingml/2006/main" xmlns:r="http://schemas.openxmlformats.org/officeDocument/2006/relationships" xmlns:p="http://schemas.openxmlformats.org/presentationml/2006/main">
+  <p:cSld>
+    <p:spTree>
+      <p:nvGrpSpPr>
+        <p:cNvPr id="1" name=""/>
+        <p:cNvGrpSpPr/>
+        <p:nvPr/>
+      </p:nvGrpSpPr>
+      <p:grpSpPr>
+        <a:xfrm>
+          <a:off x="0" y="0"/>
+          <a:ext cx="0" cy="0"/>
+          <a:chOff x="0" y="0"/>
+          <a:chExt cx="0" cy="0"/>
+        </a:xfrm>
+      </p:grpSpPr>
+      <p:pic>
+        <p:nvPicPr>
+          <p:cNvPr id="7172" name="Picture 4">
+            <a:extLst>
+              <a:ext uri="{FF2B5EF4-FFF2-40B4-BE49-F238E27FC236}">
+                <a16:creationId xmlns:a16="http://schemas.microsoft.com/office/drawing/2014/main" id="{44151A18-35BD-88CA-376F-F31D73EDC07E}"/>
+              </a:ext>
+            </a:extLst>
+          </p:cNvPr>
+          <p:cNvPicPr>
+            <a:picLocks noChangeAspect="1" noChangeArrowheads="1"/>
+          </p:cNvPicPr>
+          <p:nvPr/>
+        </p:nvPicPr>
+        <p:blipFill>
+          <a:blip r:embed="rId2">
+            <a:extLst>
+              <a:ext uri="{28A0092B-C50C-407E-A947-70E740481C1C}">
+                <a14:useLocalDpi xmlns:a14="http://schemas.microsoft.com/office/drawing/2010/main" val="0"/>
+              </a:ext>
+            </a:extLst>
+          </a:blip>
+          <a:srcRect/>
+          <a:stretch>
+            <a:fillRect/>
+          </a:stretch>
+        </p:blipFill>
+        <p:spPr bwMode="auto">
+          <a:xfrm>
+            <a:off x="1524000" y="0"/>
+            <a:ext cx="9144000" cy="6858000"/>
+          </a:xfrm>
+          <a:prstGeom prst="rect">
+            <a:avLst/>
+          </a:prstGeom>
+          <a:noFill/>
+          <a:extLst>
+            <a:ext uri="{909E8E84-426E-40DD-AFC4-6F175D3DCCD1}">
+              <a14:hiddenFill xmlns:a14="http://schemas.microsoft.com/office/drawing/2010/main">
+                <a:solidFill>
+                  <a:srgbClr val="FFFFFF"/>
+                </a:solidFill>
+              </a14:hiddenFill>
+            </a:ext>
+          </a:extLst>
+        </p:spPr>
+      </p:pic>
+    </p:spTree>
+    <p:extLst>
+      <p:ext uri="{BB962C8B-B14F-4D97-AF65-F5344CB8AC3E}">
+        <p14:creationId xmlns:p14="http://schemas.microsoft.com/office/powerpoint/2010/main" val="3818415195"/>
+      </p:ext>
+    </p:extLst>
+  </p:cSld>
+  <p:clrMapOvr>
+    <a:masterClrMapping/>
+  </p:clrMapOvr>
+</p:sld>
+</file>
+
+<file path=ppt/slides/slide12.xml><?xml version="1.0" encoding="utf-8"?>
+<p:sld xmlns:a="http://schemas.openxmlformats.org/drawingml/2006/main" xmlns:r="http://schemas.openxmlformats.org/officeDocument/2006/relationships" xmlns:p="http://schemas.openxmlformats.org/presentationml/2006/main">
+  <p:cSld>
+    <p:spTree>
+      <p:nvGrpSpPr>
+        <p:cNvPr id="1" name=""/>
+        <p:cNvGrpSpPr/>
+        <p:nvPr/>
+      </p:nvGrpSpPr>
+      <p:grpSpPr>
+        <a:xfrm>
+          <a:off x="0" y="0"/>
+          <a:ext cx="0" cy="0"/>
+          <a:chOff x="0" y="0"/>
+          <a:chExt cx="0" cy="0"/>
+        </a:xfrm>
+      </p:grpSpPr>
+      <p:pic>
+        <p:nvPicPr>
+          <p:cNvPr id="8194" name="Picture 2">
+            <a:extLst>
+              <a:ext uri="{FF2B5EF4-FFF2-40B4-BE49-F238E27FC236}">
+                <a16:creationId xmlns:a16="http://schemas.microsoft.com/office/drawing/2014/main" id="{0E3E989D-C429-C831-65C4-7CFB6C4C2083}"/>
+              </a:ext>
+            </a:extLst>
+          </p:cNvPr>
+          <p:cNvPicPr>
+            <a:picLocks noChangeAspect="1" noChangeArrowheads="1"/>
+          </p:cNvPicPr>
+          <p:nvPr/>
+        </p:nvPicPr>
+        <p:blipFill>
+          <a:blip r:embed="rId2">
+            <a:extLst>
+              <a:ext uri="{28A0092B-C50C-407E-A947-70E740481C1C}">
+                <a14:useLocalDpi xmlns:a14="http://schemas.microsoft.com/office/drawing/2010/main" val="0"/>
+              </a:ext>
+            </a:extLst>
+          </a:blip>
+          <a:srcRect/>
+          <a:stretch>
+            <a:fillRect/>
+          </a:stretch>
+        </p:blipFill>
+        <p:spPr bwMode="auto">
+          <a:xfrm>
+            <a:off x="1524000" y="0"/>
+            <a:ext cx="9144000" cy="6858000"/>
+          </a:xfrm>
+          <a:prstGeom prst="rect">
+            <a:avLst/>
+          </a:prstGeom>
+          <a:noFill/>
+          <a:extLst>
+            <a:ext uri="{909E8E84-426E-40DD-AFC4-6F175D3DCCD1}">
+              <a14:hiddenFill xmlns:a14="http://schemas.microsoft.com/office/drawing/2010/main">
+                <a:solidFill>
+                  <a:srgbClr val="FFFFFF"/>
+                </a:solidFill>
+              </a14:hiddenFill>
+            </a:ext>
+          </a:extLst>
+        </p:spPr>
+      </p:pic>
+    </p:spTree>
+    <p:extLst>
+      <p:ext uri="{BB962C8B-B14F-4D97-AF65-F5344CB8AC3E}">
+        <p14:creationId xmlns:p14="http://schemas.microsoft.com/office/powerpoint/2010/main" val="3656522444"/>
+      </p:ext>
+    </p:extLst>
+  </p:cSld>
+  <p:clrMapOvr>
+    <a:masterClrMapping/>
+  </p:clrMapOvr>
+</p:sld>
+</file>
+
+<file path=ppt/slides/slide13.xml><?xml version="1.0" encoding="utf-8"?>
+<p:sld xmlns:a="http://schemas.openxmlformats.org/drawingml/2006/main" xmlns:r="http://schemas.openxmlformats.org/officeDocument/2006/relationships" xmlns:p="http://schemas.openxmlformats.org/presentationml/2006/main">
+  <p:cSld>
+    <p:spTree>
+      <p:nvGrpSpPr>
+        <p:cNvPr id="1" name=""/>
+        <p:cNvGrpSpPr/>
+        <p:nvPr/>
+      </p:nvGrpSpPr>
+      <p:grpSpPr>
+        <a:xfrm>
+          <a:off x="0" y="0"/>
+          <a:ext cx="0" cy="0"/>
+          <a:chOff x="0" y="0"/>
+          <a:chExt cx="0" cy="0"/>
+        </a:xfrm>
+      </p:grpSpPr>
+      <p:pic>
+        <p:nvPicPr>
+          <p:cNvPr id="9218" name="Picture 2">
+            <a:extLst>
+              <a:ext uri="{FF2B5EF4-FFF2-40B4-BE49-F238E27FC236}">
+                <a16:creationId xmlns:a16="http://schemas.microsoft.com/office/drawing/2014/main" id="{E3743256-077C-5E2E-832E-6B2E37F85C1E}"/>
+              </a:ext>
+            </a:extLst>
+          </p:cNvPr>
+          <p:cNvPicPr>
+            <a:picLocks noChangeAspect="1" noChangeArrowheads="1"/>
+          </p:cNvPicPr>
+          <p:nvPr/>
+        </p:nvPicPr>
+        <p:blipFill>
+          <a:blip r:embed="rId2">
+            <a:extLst>
+              <a:ext uri="{28A0092B-C50C-407E-A947-70E740481C1C}">
+                <a14:useLocalDpi xmlns:a14="http://schemas.microsoft.com/office/drawing/2010/main" val="0"/>
+              </a:ext>
+            </a:extLst>
+          </a:blip>
+          <a:srcRect/>
+          <a:stretch>
+            <a:fillRect/>
+          </a:stretch>
+        </p:blipFill>
+        <p:spPr bwMode="auto">
+          <a:xfrm>
+            <a:off x="1524000" y="0"/>
+            <a:ext cx="9144000" cy="6858000"/>
+          </a:xfrm>
+          <a:prstGeom prst="rect">
+            <a:avLst/>
+          </a:prstGeom>
+          <a:noFill/>
+          <a:extLst>
+            <a:ext uri="{909E8E84-426E-40DD-AFC4-6F175D3DCCD1}">
+              <a14:hiddenFill xmlns:a14="http://schemas.microsoft.com/office/drawing/2010/main">
+                <a:solidFill>
+                  <a:srgbClr val="FFFFFF"/>
+                </a:solidFill>
+              </a14:hiddenFill>
+            </a:ext>
+          </a:extLst>
+        </p:spPr>
+      </p:pic>
+    </p:spTree>
+    <p:extLst>
+      <p:ext uri="{BB962C8B-B14F-4D97-AF65-F5344CB8AC3E}">
+        <p14:creationId xmlns:p14="http://schemas.microsoft.com/office/powerpoint/2010/main" val="516056363"/>
+      </p:ext>
+    </p:extLst>
+  </p:cSld>
+  <p:clrMapOvr>
+    <a:masterClrMapping/>
+  </p:clrMapOvr>
+</p:sld>
+</file>
+
+<file path=ppt/slides/slide14.xml><?xml version="1.0" encoding="utf-8"?>
+<p:sld xmlns:a="http://schemas.openxmlformats.org/drawingml/2006/main" xmlns:r="http://schemas.openxmlformats.org/officeDocument/2006/relationships" xmlns:p="http://schemas.openxmlformats.org/presentationml/2006/main">
+  <p:cSld>
+    <p:spTree>
+      <p:nvGrpSpPr>
+        <p:cNvPr id="1" name=""/>
+        <p:cNvGrpSpPr/>
+        <p:nvPr/>
+      </p:nvGrpSpPr>
+      <p:grpSpPr>
+        <a:xfrm>
+          <a:off x="0" y="0"/>
+          <a:ext cx="0" cy="0"/>
+          <a:chOff x="0" y="0"/>
+          <a:chExt cx="0" cy="0"/>
+        </a:xfrm>
+      </p:grpSpPr>
+      <p:pic>
+        <p:nvPicPr>
+          <p:cNvPr id="10242" name="Picture 2">
+            <a:extLst>
+              <a:ext uri="{FF2B5EF4-FFF2-40B4-BE49-F238E27FC236}">
+                <a16:creationId xmlns:a16="http://schemas.microsoft.com/office/drawing/2014/main" id="{3A67516E-2D69-D601-E8FB-E5F812E54D20}"/>
+              </a:ext>
+            </a:extLst>
+          </p:cNvPr>
+          <p:cNvPicPr>
+            <a:picLocks noChangeAspect="1" noChangeArrowheads="1"/>
+          </p:cNvPicPr>
+          <p:nvPr/>
+        </p:nvPicPr>
+        <p:blipFill>
+          <a:blip r:embed="rId2">
+            <a:extLst>
+              <a:ext uri="{28A0092B-C50C-407E-A947-70E740481C1C}">
+                <a14:useLocalDpi xmlns:a14="http://schemas.microsoft.com/office/drawing/2010/main" val="0"/>
+              </a:ext>
+            </a:extLst>
+          </a:blip>
+          <a:srcRect/>
+          <a:stretch>
+            <a:fillRect/>
+          </a:stretch>
+        </p:blipFill>
+        <p:spPr bwMode="auto">
+          <a:xfrm>
+            <a:off x="1524000" y="0"/>
+            <a:ext cx="9144000" cy="6858000"/>
+          </a:xfrm>
+          <a:prstGeom prst="rect">
+            <a:avLst/>
+          </a:prstGeom>
+          <a:noFill/>
+          <a:extLst>
+            <a:ext uri="{909E8E84-426E-40DD-AFC4-6F175D3DCCD1}">
+              <a14:hiddenFill xmlns:a14="http://schemas.microsoft.com/office/drawing/2010/main">
+                <a:solidFill>
+                  <a:srgbClr val="FFFFFF"/>
+                </a:solidFill>
+              </a14:hiddenFill>
+            </a:ext>
+          </a:extLst>
+        </p:spPr>
+      </p:pic>
+    </p:spTree>
+    <p:extLst>
+      <p:ext uri="{BB962C8B-B14F-4D97-AF65-F5344CB8AC3E}">
+        <p14:creationId xmlns:p14="http://schemas.microsoft.com/office/powerpoint/2010/main" val="3998248090"/>
+      </p:ext>
+    </p:extLst>
+  </p:cSld>
+  <p:clrMapOvr>
+    <a:masterClrMapping/>
+  </p:clrMapOvr>
+</p:sld>
+</file>
+
+<file path=ppt/slides/slide15.xml><?xml version="1.0" encoding="utf-8"?>
+<p:sld xmlns:a="http://schemas.openxmlformats.org/drawingml/2006/main" xmlns:r="http://schemas.openxmlformats.org/officeDocument/2006/relationships" xmlns:p="http://schemas.openxmlformats.org/presentationml/2006/main">
+  <p:cSld>
+    <p:spTree>
+      <p:nvGrpSpPr>
+        <p:cNvPr id="1" name=""/>
+        <p:cNvGrpSpPr/>
+        <p:nvPr/>
+      </p:nvGrpSpPr>
+      <p:grpSpPr>
+        <a:xfrm>
+          <a:off x="0" y="0"/>
+          <a:ext cx="0" cy="0"/>
+          <a:chOff x="0" y="0"/>
+          <a:chExt cx="0" cy="0"/>
+        </a:xfrm>
+      </p:grpSpPr>
+      <p:sp>
+        <p:nvSpPr>
+          <p:cNvPr id="4" name="矩形 3">
+            <a:extLst>
+              <a:ext uri="{FF2B5EF4-FFF2-40B4-BE49-F238E27FC236}">
+                <a16:creationId xmlns:a16="http://schemas.microsoft.com/office/drawing/2014/main" id="{31EAD35B-87C8-4602-EF87-59402FBB15B1}"/>
+              </a:ext>
+            </a:extLst>
+          </p:cNvPr>
+          <p:cNvSpPr/>
+          <p:nvPr/>
+        </p:nvSpPr>
+        <p:spPr>
+          <a:xfrm>
+            <a:off x="677732" y="1003150"/>
+            <a:ext cx="2689412" cy="4851699"/>
+          </a:xfrm>
+          <a:prstGeom prst="rect">
+            <a:avLst/>
+          </a:prstGeom>
+        </p:spPr>
+        <p:style>
+          <a:lnRef idx="1">
+            <a:schemeClr val="accent4"/>
+          </a:lnRef>
+          <a:fillRef idx="2">
+            <a:schemeClr val="accent4"/>
+          </a:fillRef>
+          <a:effectRef idx="1">
+            <a:schemeClr val="accent4"/>
+          </a:effectRef>
+          <a:fontRef idx="minor">
+            <a:schemeClr val="dk1"/>
+          </a:fontRef>
+        </p:style>
+        <p:txBody>
+          <a:bodyPr rtlCol="0" anchor="ctr"/>
+          <a:lstStyle/>
+          <a:p>
+            <a:pPr algn="ctr"/>
+            <a:r>
+              <a:rPr kumimoji="1" lang="zh-CN" altLang="en-US" dirty="0"/>
+              <a:t>事件池</a:t>
+            </a:r>
+          </a:p>
+        </p:txBody>
+      </p:sp>
+      <p:sp>
+        <p:nvSpPr>
+          <p:cNvPr id="5" name="矩形 4">
+            <a:extLst>
+              <a:ext uri="{FF2B5EF4-FFF2-40B4-BE49-F238E27FC236}">
+                <a16:creationId xmlns:a16="http://schemas.microsoft.com/office/drawing/2014/main" id="{C0DFD30B-AE91-B517-BFE3-E8833A616D42}"/>
+              </a:ext>
+            </a:extLst>
+          </p:cNvPr>
+          <p:cNvSpPr/>
+          <p:nvPr/>
+        </p:nvSpPr>
+        <p:spPr>
+          <a:xfrm>
+            <a:off x="3519544" y="1003150"/>
+            <a:ext cx="5140362" cy="4851699"/>
+          </a:xfrm>
+          <a:prstGeom prst="rect">
+            <a:avLst/>
+          </a:prstGeom>
+        </p:spPr>
+        <p:style>
+          <a:lnRef idx="1">
+            <a:schemeClr val="accent4"/>
+          </a:lnRef>
+          <a:fillRef idx="2">
+            <a:schemeClr val="accent4"/>
+          </a:fillRef>
+          <a:effectRef idx="1">
+            <a:schemeClr val="accent4"/>
+          </a:effectRef>
+          <a:fontRef idx="minor">
+            <a:schemeClr val="dk1"/>
+          </a:fontRef>
+        </p:style>
+        <p:txBody>
+          <a:bodyPr rtlCol="0" anchor="ctr"/>
+          <a:lstStyle/>
+          <a:p>
+            <a:pPr algn="ctr"/>
+            <a:r>
+              <a:rPr kumimoji="1" lang="zh-CN" altLang="en-US" dirty="0"/>
+              <a:t>今日时间线</a:t>
+            </a:r>
+          </a:p>
+        </p:txBody>
+      </p:sp>
+      <p:sp>
+        <p:nvSpPr>
+          <p:cNvPr id="6" name="矩形 5">
+            <a:extLst>
+              <a:ext uri="{FF2B5EF4-FFF2-40B4-BE49-F238E27FC236}">
+                <a16:creationId xmlns:a16="http://schemas.microsoft.com/office/drawing/2014/main" id="{0B4B6D7D-8BD8-11F3-937D-ECD504010D7E}"/>
+              </a:ext>
+            </a:extLst>
+          </p:cNvPr>
+          <p:cNvSpPr/>
+          <p:nvPr/>
+        </p:nvSpPr>
+        <p:spPr>
+          <a:xfrm>
+            <a:off x="8812306" y="2549562"/>
+            <a:ext cx="2689412" cy="3305287"/>
+          </a:xfrm>
+          <a:prstGeom prst="rect">
+            <a:avLst/>
+          </a:prstGeom>
+        </p:spPr>
+        <p:style>
+          <a:lnRef idx="1">
+            <a:schemeClr val="accent4"/>
+          </a:lnRef>
+          <a:fillRef idx="2">
+            <a:schemeClr val="accent4"/>
+          </a:fillRef>
+          <a:effectRef idx="1">
+            <a:schemeClr val="accent4"/>
+          </a:effectRef>
+          <a:fontRef idx="minor">
+            <a:schemeClr val="dk1"/>
+          </a:fontRef>
+        </p:style>
+        <p:txBody>
+          <a:bodyPr rtlCol="0" anchor="ctr"/>
+          <a:lstStyle/>
+          <a:p>
+            <a:pPr algn="ctr"/>
+            <a:r>
+              <a:rPr kumimoji="1" lang="zh-CN" altLang="en-US" dirty="0"/>
+              <a:t>番茄休息提醒</a:t>
+            </a:r>
+          </a:p>
+        </p:txBody>
+      </p:sp>
+      <p:sp>
+        <p:nvSpPr>
+          <p:cNvPr id="7" name="矩形 6">
+            <a:extLst>
+              <a:ext uri="{FF2B5EF4-FFF2-40B4-BE49-F238E27FC236}">
+                <a16:creationId xmlns:a16="http://schemas.microsoft.com/office/drawing/2014/main" id="{3976C182-F3C6-056A-FA39-E9F813971005}"/>
+              </a:ext>
+            </a:extLst>
+          </p:cNvPr>
+          <p:cNvSpPr/>
+          <p:nvPr/>
+        </p:nvSpPr>
+        <p:spPr>
+          <a:xfrm>
+            <a:off x="8812306" y="1003151"/>
+            <a:ext cx="2689412" cy="1449594"/>
+          </a:xfrm>
+          <a:prstGeom prst="rect">
+            <a:avLst/>
+          </a:prstGeom>
+        </p:spPr>
+        <p:style>
+          <a:lnRef idx="1">
+            <a:schemeClr val="accent4"/>
+          </a:lnRef>
+          <a:fillRef idx="2">
+            <a:schemeClr val="accent4"/>
+          </a:fillRef>
+          <a:effectRef idx="1">
+            <a:schemeClr val="accent4"/>
+          </a:effectRef>
+          <a:fontRef idx="minor">
+            <a:schemeClr val="dk1"/>
+          </a:fontRef>
+        </p:style>
+        <p:txBody>
+          <a:bodyPr rtlCol="0" anchor="ctr"/>
+          <a:lstStyle/>
+          <a:p>
+            <a:pPr algn="ctr"/>
+            <a:r>
+              <a:rPr kumimoji="1" lang="zh-CN" altLang="en-US" dirty="0"/>
+              <a:t>今日目标</a:t>
+            </a:r>
+          </a:p>
+        </p:txBody>
+      </p:sp>
+      <p:sp>
+        <p:nvSpPr>
+          <p:cNvPr id="8" name="矩形 7">
+            <a:extLst>
+              <a:ext uri="{FF2B5EF4-FFF2-40B4-BE49-F238E27FC236}">
+                <a16:creationId xmlns:a16="http://schemas.microsoft.com/office/drawing/2014/main" id="{5F1D0CA9-7FA9-5C78-C0EA-85B301921FEF}"/>
+              </a:ext>
+            </a:extLst>
+          </p:cNvPr>
+          <p:cNvSpPr/>
+          <p:nvPr/>
+        </p:nvSpPr>
+        <p:spPr>
+          <a:xfrm>
+            <a:off x="849854" y="1118795"/>
+            <a:ext cx="2377440" cy="290457"/>
+          </a:xfrm>
+          <a:prstGeom prst="rect">
+            <a:avLst/>
+          </a:prstGeom>
+        </p:spPr>
+        <p:style>
+          <a:lnRef idx="2">
+            <a:schemeClr val="accent1">
+              <a:shade val="50000"/>
+            </a:schemeClr>
+          </a:lnRef>
+          <a:fillRef idx="1">
+            <a:schemeClr val="accent1"/>
+          </a:fillRef>
+          <a:effectRef idx="0">
+            <a:schemeClr val="accent1"/>
+          </a:effectRef>
+          <a:fontRef idx="minor">
+            <a:schemeClr val="lt1"/>
+          </a:fontRef>
+        </p:style>
+        <p:txBody>
+          <a:bodyPr rtlCol="0" anchor="ctr"/>
+          <a:lstStyle/>
+          <a:p>
+            <a:pPr algn="ctr"/>
+            <a:r>
+              <a:rPr kumimoji="1" lang="zh-CN" altLang="en-US" dirty="0"/>
+              <a:t>搜索框</a:t>
+            </a:r>
+          </a:p>
+        </p:txBody>
+      </p:sp>
+      <p:sp>
+        <p:nvSpPr>
+          <p:cNvPr id="10" name="文本框 9">
+            <a:extLst>
+              <a:ext uri="{FF2B5EF4-FFF2-40B4-BE49-F238E27FC236}">
+                <a16:creationId xmlns:a16="http://schemas.microsoft.com/office/drawing/2014/main" id="{FC7A0CDF-2A4C-6D73-C76C-30A33DB6EB5C}"/>
+              </a:ext>
+            </a:extLst>
+          </p:cNvPr>
+          <p:cNvSpPr txBox="1"/>
+          <p:nvPr/>
+        </p:nvSpPr>
+        <p:spPr>
+          <a:xfrm>
+            <a:off x="1253744" y="4815875"/>
+            <a:ext cx="1569660" cy="923330"/>
+          </a:xfrm>
+          <a:prstGeom prst="rect">
+            <a:avLst/>
+          </a:prstGeom>
+          <a:noFill/>
+        </p:spPr>
+        <p:txBody>
+          <a:bodyPr wrap="none" rtlCol="0">
+            <a:spAutoFit/>
+          </a:bodyPr>
+          <a:lstStyle/>
+          <a:p>
+            <a:r>
+              <a:rPr kumimoji="1" lang="zh-CN" altLang="en-US" dirty="0"/>
+              <a:t>今日新增代办</a:t>
+            </a:r>
+            <a:endParaRPr kumimoji="1" lang="en-US" altLang="zh-CN" dirty="0"/>
+          </a:p>
+          <a:p>
+            <a:r>
+              <a:rPr kumimoji="1" lang="zh-CN" altLang="en-US" dirty="0"/>
+              <a:t>今日计划</a:t>
+            </a:r>
+            <a:endParaRPr kumimoji="1" lang="en-US" altLang="zh-CN" dirty="0"/>
+          </a:p>
+          <a:p>
+            <a:r>
+              <a:rPr kumimoji="1" lang="zh-CN" altLang="en-US" dirty="0"/>
+              <a:t>今日收藏</a:t>
+            </a:r>
+          </a:p>
+        </p:txBody>
+      </p:sp>
+    </p:spTree>
+    <p:extLst>
+      <p:ext uri="{BB962C8B-B14F-4D97-AF65-F5344CB8AC3E}">
+        <p14:creationId xmlns:p14="http://schemas.microsoft.com/office/powerpoint/2010/main" val="2046115367"/>
+      </p:ext>
+    </p:extLst>
+  </p:cSld>
+  <p:clrMapOvr>
+    <a:masterClrMapping/>
+  </p:clrMapOvr>
+</p:sld>
+</file>
+
 <file path=ppt/slides/slide2.xml><?xml version="1.0" encoding="utf-8"?>
 <p:sld xmlns:a="http://schemas.openxmlformats.org/drawingml/2006/main" xmlns:r="http://schemas.openxmlformats.org/officeDocument/2006/relationships" xmlns:p="http://schemas.openxmlformats.org/presentationml/2006/main">
   <p:cSld>
@@ -4306,6 +5452,675 @@
     <p:extLst>
       <p:ext uri="{BB962C8B-B14F-4D97-AF65-F5344CB8AC3E}">
         <p14:creationId xmlns:p14="http://schemas.microsoft.com/office/powerpoint/2010/main" val="3098712097"/>
+      </p:ext>
+    </p:extLst>
+  </p:cSld>
+  <p:clrMapOvr>
+    <a:masterClrMapping/>
+  </p:clrMapOvr>
+</p:sld>
+</file>
+
+<file path=ppt/slides/slide5.xml><?xml version="1.0" encoding="utf-8"?>
+<p:sld xmlns:a="http://schemas.openxmlformats.org/drawingml/2006/main" xmlns:r="http://schemas.openxmlformats.org/officeDocument/2006/relationships" xmlns:p="http://schemas.openxmlformats.org/presentationml/2006/main">
+  <p:cSld>
+    <p:bg>
+      <p:bgPr>
+        <a:solidFill>
+          <a:schemeClr val="bg1"/>
+        </a:solidFill>
+        <a:effectLst/>
+      </p:bgPr>
+    </p:bg>
+    <p:spTree>
+      <p:nvGrpSpPr>
+        <p:cNvPr id="1" name=""/>
+        <p:cNvGrpSpPr/>
+        <p:nvPr/>
+      </p:nvGrpSpPr>
+      <p:grpSpPr>
+        <a:xfrm>
+          <a:off x="0" y="0"/>
+          <a:ext cx="0" cy="0"/>
+          <a:chOff x="0" y="0"/>
+          <a:chExt cx="0" cy="0"/>
+        </a:xfrm>
+      </p:grpSpPr>
+      <p:sp useBgFill="1">
+        <p:nvSpPr>
+          <p:cNvPr id="1039" name="Rectangle 1030">
+            <a:extLst>
+              <a:ext uri="{FF2B5EF4-FFF2-40B4-BE49-F238E27FC236}">
+                <a16:creationId xmlns:a16="http://schemas.microsoft.com/office/drawing/2014/main" id="{AB8C311F-7253-4AED-9701-7FC0708C41C7}"/>
+              </a:ext>
+              <a:ext uri="{C183D7F6-B498-43B3-948B-1728B52AA6E4}">
+                <adec:decorative xmlns:adec="http://schemas.microsoft.com/office/drawing/2017/decorative" val="1"/>
+              </a:ext>
+            </a:extLst>
+          </p:cNvPr>
+          <p:cNvSpPr>
+            <a:spLocks noGrp="1" noRot="1" noChangeAspect="1" noMove="1" noResize="1" noEditPoints="1" noAdjustHandles="1" noChangeArrowheads="1" noChangeShapeType="1" noTextEdit="1"/>
+          </p:cNvSpPr>
+          <p:nvPr>
+            <p:extLst>
+              <p:ext uri="{386F3935-93C4-4BCD-93E2-E3B085C9AB24}">
+                <p16:designElem xmlns:p16="http://schemas.microsoft.com/office/powerpoint/2015/main" val="1"/>
+              </p:ext>
+            </p:extLst>
+          </p:nvPr>
+        </p:nvSpPr>
+        <p:spPr>
+          <a:xfrm>
+            <a:off x="0" y="0"/>
+            <a:ext cx="12192000" cy="6858000"/>
+          </a:xfrm>
+          <a:prstGeom prst="rect">
+            <a:avLst/>
+          </a:prstGeom>
+          <a:ln w="12700" cap="flat" cmpd="sng" algn="ctr">
+            <a:noFill/>
+            <a:prstDash val="solid"/>
+            <a:miter lim="800000"/>
+          </a:ln>
+          <a:effectLst/>
+          <a:extLst>
+            <a:ext uri="{91240B29-F687-4F45-9708-019B960494DF}">
+              <a14:hiddenLine xmlns:a14="http://schemas.microsoft.com/office/drawing/2010/main" w="12700" cap="flat" cmpd="sng" algn="ctr">
+                <a:solidFill>
+                  <a:schemeClr val="accent1">
+                    <a:shade val="50000"/>
+                  </a:schemeClr>
+                </a:solidFill>
+                <a:prstDash val="solid"/>
+                <a:miter lim="800000"/>
+              </a14:hiddenLine>
+            </a:ext>
+          </a:extLst>
+        </p:spPr>
+        <p:style>
+          <a:lnRef idx="2">
+            <a:schemeClr val="accent1">
+              <a:shade val="50000"/>
+            </a:schemeClr>
+          </a:lnRef>
+          <a:fillRef idx="1">
+            <a:schemeClr val="accent1"/>
+          </a:fillRef>
+          <a:effectRef idx="0">
+            <a:schemeClr val="accent1"/>
+          </a:effectRef>
+          <a:fontRef idx="minor">
+            <a:schemeClr val="lt1"/>
+          </a:fontRef>
+        </p:style>
+        <p:txBody>
+          <a:bodyPr rtlCol="0" anchor="ctr"/>
+          <a:lstStyle/>
+          <a:p>
+            <a:pPr algn="ctr"/>
+            <a:endParaRPr lang="en-US"/>
+          </a:p>
+        </p:txBody>
+      </p:sp>
+      <p:sp>
+        <p:nvSpPr>
+          <p:cNvPr id="1040" name="Rectangle 1032">
+            <a:extLst>
+              <a:ext uri="{FF2B5EF4-FFF2-40B4-BE49-F238E27FC236}">
+                <a16:creationId xmlns:a16="http://schemas.microsoft.com/office/drawing/2014/main" id="{E2384209-CB15-4CDF-9D31-C44FD9A3F20D}"/>
+              </a:ext>
+              <a:ext uri="{C183D7F6-B498-43B3-948B-1728B52AA6E4}">
+                <adec:decorative xmlns:adec="http://schemas.microsoft.com/office/drawing/2017/decorative" val="1"/>
+              </a:ext>
+            </a:extLst>
+          </p:cNvPr>
+          <p:cNvSpPr>
+            <a:spLocks noGrp="1" noRot="1" noChangeAspect="1" noMove="1" noResize="1" noEditPoints="1" noAdjustHandles="1" noChangeArrowheads="1" noChangeShapeType="1" noTextEdit="1"/>
+          </p:cNvSpPr>
+          <p:nvPr>
+            <p:extLst>
+              <p:ext uri="{386F3935-93C4-4BCD-93E2-E3B085C9AB24}">
+                <p16:designElem xmlns:p16="http://schemas.microsoft.com/office/powerpoint/2015/main" val="1"/>
+              </p:ext>
+            </p:extLst>
+          </p:nvPr>
+        </p:nvSpPr>
+        <p:spPr>
+          <a:xfrm rot="16200000" flipH="1">
+            <a:off x="2666617" y="-2666188"/>
+            <a:ext cx="6858000" cy="12191233"/>
+          </a:xfrm>
+          <a:prstGeom prst="rect">
+            <a:avLst/>
+          </a:prstGeom>
+          <a:gradFill>
+            <a:gsLst>
+              <a:gs pos="8000">
+                <a:schemeClr val="accent1"/>
+              </a:gs>
+              <a:gs pos="100000">
+                <a:schemeClr val="accent1">
+                  <a:lumMod val="50000"/>
+                </a:schemeClr>
+              </a:gs>
+            </a:gsLst>
+            <a:lin ang="12000000" scaled="0"/>
+          </a:gradFill>
+          <a:ln>
+            <a:noFill/>
+          </a:ln>
+        </p:spPr>
+        <p:style>
+          <a:lnRef idx="2">
+            <a:schemeClr val="accent1">
+              <a:shade val="50000"/>
+            </a:schemeClr>
+          </a:lnRef>
+          <a:fillRef idx="1">
+            <a:schemeClr val="accent1"/>
+          </a:fillRef>
+          <a:effectRef idx="0">
+            <a:schemeClr val="accent1"/>
+          </a:effectRef>
+          <a:fontRef idx="minor">
+            <a:schemeClr val="lt1"/>
+          </a:fontRef>
+        </p:style>
+        <p:txBody>
+          <a:bodyPr rtlCol="0" anchor="ctr"/>
+          <a:lstStyle/>
+          <a:p>
+            <a:pPr algn="ctr"/>
+            <a:endParaRPr lang="en-US"/>
+          </a:p>
+        </p:txBody>
+      </p:sp>
+      <p:sp>
+        <p:nvSpPr>
+          <p:cNvPr id="1041" name="Rectangle 1034">
+            <a:extLst>
+              <a:ext uri="{FF2B5EF4-FFF2-40B4-BE49-F238E27FC236}">
+                <a16:creationId xmlns:a16="http://schemas.microsoft.com/office/drawing/2014/main" id="{2633B3B5-CC90-43F0-8714-D31D1F3F0209}"/>
+              </a:ext>
+              <a:ext uri="{C183D7F6-B498-43B3-948B-1728B52AA6E4}">
+                <adec:decorative xmlns:adec="http://schemas.microsoft.com/office/drawing/2017/decorative" val="1"/>
+              </a:ext>
+            </a:extLst>
+          </p:cNvPr>
+          <p:cNvSpPr>
+            <a:spLocks noGrp="1" noRot="1" noChangeAspect="1" noMove="1" noResize="1" noEditPoints="1" noAdjustHandles="1" noChangeArrowheads="1" noChangeShapeType="1" noTextEdit="1"/>
+          </p:cNvSpPr>
+          <p:nvPr>
+            <p:extLst>
+              <p:ext uri="{386F3935-93C4-4BCD-93E2-E3B085C9AB24}">
+                <p16:designElem xmlns:p16="http://schemas.microsoft.com/office/powerpoint/2015/main" val="1"/>
+              </p:ext>
+            </p:extLst>
+          </p:nvPr>
+        </p:nvSpPr>
+        <p:spPr>
+          <a:xfrm rot="10800000" flipH="1">
+            <a:off x="-2311" y="0"/>
+            <a:ext cx="9070846" cy="6857572"/>
+          </a:xfrm>
+          <a:prstGeom prst="rect">
+            <a:avLst/>
+          </a:prstGeom>
+          <a:gradFill>
+            <a:gsLst>
+              <a:gs pos="8000">
+                <a:srgbClr val="000000">
+                  <a:alpha val="52000"/>
+                </a:srgbClr>
+              </a:gs>
+              <a:gs pos="100000">
+                <a:schemeClr val="accent1"/>
+              </a:gs>
+            </a:gsLst>
+            <a:lin ang="4800000" scaled="0"/>
+          </a:gradFill>
+          <a:ln>
+            <a:noFill/>
+          </a:ln>
+        </p:spPr>
+        <p:style>
+          <a:lnRef idx="2">
+            <a:schemeClr val="accent1">
+              <a:shade val="50000"/>
+            </a:schemeClr>
+          </a:lnRef>
+          <a:fillRef idx="1">
+            <a:schemeClr val="accent1"/>
+          </a:fillRef>
+          <a:effectRef idx="0">
+            <a:schemeClr val="accent1"/>
+          </a:effectRef>
+          <a:fontRef idx="minor">
+            <a:schemeClr val="lt1"/>
+          </a:fontRef>
+        </p:style>
+        <p:txBody>
+          <a:bodyPr rtlCol="0" anchor="ctr"/>
+          <a:lstStyle/>
+          <a:p>
+            <a:pPr algn="ctr"/>
+            <a:endParaRPr lang="en-US"/>
+          </a:p>
+        </p:txBody>
+      </p:sp>
+      <p:sp>
+        <p:nvSpPr>
+          <p:cNvPr id="1042" name="Rectangle 1036">
+            <a:extLst>
+              <a:ext uri="{FF2B5EF4-FFF2-40B4-BE49-F238E27FC236}">
+                <a16:creationId xmlns:a16="http://schemas.microsoft.com/office/drawing/2014/main" id="{A8D57A06-A426-446D-B02C-A2DC6B62E45E}"/>
+              </a:ext>
+              <a:ext uri="{C183D7F6-B498-43B3-948B-1728B52AA6E4}">
+                <adec:decorative xmlns:adec="http://schemas.microsoft.com/office/drawing/2017/decorative" val="1"/>
+              </a:ext>
+            </a:extLst>
+          </p:cNvPr>
+          <p:cNvSpPr>
+            <a:spLocks noGrp="1" noRot="1" noChangeAspect="1" noMove="1" noResize="1" noEditPoints="1" noAdjustHandles="1" noChangeArrowheads="1" noChangeShapeType="1" noTextEdit="1"/>
+          </p:cNvSpPr>
+          <p:nvPr>
+            <p:extLst>
+              <p:ext uri="{386F3935-93C4-4BCD-93E2-E3B085C9AB24}">
+                <p16:designElem xmlns:p16="http://schemas.microsoft.com/office/powerpoint/2015/main" val="1"/>
+              </p:ext>
+            </p:extLst>
+          </p:nvPr>
+        </p:nvSpPr>
+        <p:spPr>
+          <a:xfrm rot="16200000" flipH="1">
+            <a:off x="3649491" y="-1685840"/>
+            <a:ext cx="4894564" cy="12193546"/>
+          </a:xfrm>
+          <a:prstGeom prst="rect">
+            <a:avLst/>
+          </a:prstGeom>
+          <a:gradFill>
+            <a:gsLst>
+              <a:gs pos="0">
+                <a:schemeClr val="accent5">
+                  <a:lumMod val="60000"/>
+                  <a:lumOff val="40000"/>
+                  <a:alpha val="0"/>
+                </a:schemeClr>
+              </a:gs>
+              <a:gs pos="100000">
+                <a:srgbClr val="000000">
+                  <a:alpha val="46000"/>
+                </a:srgbClr>
+              </a:gs>
+            </a:gsLst>
+            <a:lin ang="1200000" scaled="0"/>
+          </a:gradFill>
+          <a:ln>
+            <a:noFill/>
+          </a:ln>
+        </p:spPr>
+        <p:style>
+          <a:lnRef idx="2">
+            <a:schemeClr val="accent1">
+              <a:shade val="50000"/>
+            </a:schemeClr>
+          </a:lnRef>
+          <a:fillRef idx="1">
+            <a:schemeClr val="accent1"/>
+          </a:fillRef>
+          <a:effectRef idx="0">
+            <a:schemeClr val="accent1"/>
+          </a:effectRef>
+          <a:fontRef idx="minor">
+            <a:schemeClr val="lt1"/>
+          </a:fontRef>
+        </p:style>
+        <p:txBody>
+          <a:bodyPr rtlCol="0" anchor="ctr"/>
+          <a:lstStyle/>
+          <a:p>
+            <a:pPr algn="ctr"/>
+            <a:endParaRPr lang="en-US"/>
+          </a:p>
+        </p:txBody>
+      </p:sp>
+      <p:pic>
+        <p:nvPicPr>
+          <p:cNvPr id="1026" name="Picture 2" descr="图形用户界面, 应用程序&#10;&#10;描述已自动生成">
+            <a:extLst>
+              <a:ext uri="{FF2B5EF4-FFF2-40B4-BE49-F238E27FC236}">
+                <a16:creationId xmlns:a16="http://schemas.microsoft.com/office/drawing/2014/main" id="{0DDB0CDC-D87B-E970-D897-179CDD750ADE}"/>
+              </a:ext>
+            </a:extLst>
+          </p:cNvPr>
+          <p:cNvPicPr>
+            <a:picLocks noChangeAspect="1" noChangeArrowheads="1"/>
+          </p:cNvPicPr>
+          <p:nvPr/>
+        </p:nvPicPr>
+        <p:blipFill>
+          <a:blip r:embed="rId2">
+            <a:extLst>
+              <a:ext uri="{28A0092B-C50C-407E-A947-70E740481C1C}">
+                <a14:useLocalDpi xmlns:a14="http://schemas.microsoft.com/office/drawing/2010/main" val="0"/>
+              </a:ext>
+            </a:extLst>
+          </a:blip>
+          <a:stretch>
+            <a:fillRect/>
+          </a:stretch>
+        </p:blipFill>
+        <p:spPr bwMode="auto">
+          <a:xfrm>
+            <a:off x="-1" y="0"/>
+            <a:ext cx="9143429" cy="6857572"/>
+          </a:xfrm>
+          <a:prstGeom prst="rect">
+            <a:avLst/>
+          </a:prstGeom>
+          <a:noFill/>
+          <a:extLst>
+            <a:ext uri="{909E8E84-426E-40DD-AFC4-6F175D3DCCD1}">
+              <a14:hiddenFill xmlns:a14="http://schemas.microsoft.com/office/drawing/2010/main">
+                <a:solidFill>
+                  <a:srgbClr val="FFFFFF"/>
+                </a:solidFill>
+              </a14:hiddenFill>
+            </a:ext>
+          </a:extLst>
+        </p:spPr>
+      </p:pic>
+    </p:spTree>
+    <p:extLst>
+      <p:ext uri="{BB962C8B-B14F-4D97-AF65-F5344CB8AC3E}">
+        <p14:creationId xmlns:p14="http://schemas.microsoft.com/office/powerpoint/2010/main" val="1042264141"/>
+      </p:ext>
+    </p:extLst>
+  </p:cSld>
+  <p:clrMapOvr>
+    <a:masterClrMapping/>
+  </p:clrMapOvr>
+</p:sld>
+</file>
+
+<file path=ppt/slides/slide6.xml><?xml version="1.0" encoding="utf-8"?>
+<p:sld xmlns:a="http://schemas.openxmlformats.org/drawingml/2006/main" xmlns:r="http://schemas.openxmlformats.org/officeDocument/2006/relationships" xmlns:p="http://schemas.openxmlformats.org/presentationml/2006/main">
+  <p:cSld>
+    <p:spTree>
+      <p:nvGrpSpPr>
+        <p:cNvPr id="1" name=""/>
+        <p:cNvGrpSpPr/>
+        <p:nvPr/>
+      </p:nvGrpSpPr>
+      <p:grpSpPr>
+        <a:xfrm>
+          <a:off x="0" y="0"/>
+          <a:ext cx="0" cy="0"/>
+          <a:chOff x="0" y="0"/>
+          <a:chExt cx="0" cy="0"/>
+        </a:xfrm>
+      </p:grpSpPr>
+      <p:pic>
+        <p:nvPicPr>
+          <p:cNvPr id="4" name="图片 3">
+            <a:extLst>
+              <a:ext uri="{FF2B5EF4-FFF2-40B4-BE49-F238E27FC236}">
+                <a16:creationId xmlns:a16="http://schemas.microsoft.com/office/drawing/2014/main" id="{A96710D9-EF79-5B60-EBCB-63E42664FE75}"/>
+              </a:ext>
+            </a:extLst>
+          </p:cNvPr>
+          <p:cNvPicPr>
+            <a:picLocks noChangeAspect="1"/>
+          </p:cNvPicPr>
+          <p:nvPr/>
+        </p:nvPicPr>
+        <p:blipFill rotWithShape="1">
+          <a:blip r:embed="rId2"/>
+          <a:srcRect l="16561" t="3095" r="17583" b="3469"/>
+          <a:stretch/>
+        </p:blipFill>
+        <p:spPr>
+          <a:xfrm>
+            <a:off x="1162878" y="0"/>
+            <a:ext cx="6440557" cy="6853252"/>
+          </a:xfrm>
+          <a:prstGeom prst="rect">
+            <a:avLst/>
+          </a:prstGeom>
+        </p:spPr>
+      </p:pic>
+    </p:spTree>
+    <p:extLst>
+      <p:ext uri="{BB962C8B-B14F-4D97-AF65-F5344CB8AC3E}">
+        <p14:creationId xmlns:p14="http://schemas.microsoft.com/office/powerpoint/2010/main" val="176989875"/>
+      </p:ext>
+    </p:extLst>
+  </p:cSld>
+  <p:clrMapOvr>
+    <a:masterClrMapping/>
+  </p:clrMapOvr>
+</p:sld>
+</file>
+
+<file path=ppt/slides/slide7.xml><?xml version="1.0" encoding="utf-8"?>
+<p:sld xmlns:a="http://schemas.openxmlformats.org/drawingml/2006/main" xmlns:r="http://schemas.openxmlformats.org/officeDocument/2006/relationships" xmlns:p="http://schemas.openxmlformats.org/presentationml/2006/main">
+  <p:cSld>
+    <p:spTree>
+      <p:nvGrpSpPr>
+        <p:cNvPr id="1" name=""/>
+        <p:cNvGrpSpPr/>
+        <p:nvPr/>
+      </p:nvGrpSpPr>
+      <p:grpSpPr>
+        <a:xfrm>
+          <a:off x="0" y="0"/>
+          <a:ext cx="0" cy="0"/>
+          <a:chOff x="0" y="0"/>
+          <a:chExt cx="0" cy="0"/>
+        </a:xfrm>
+      </p:grpSpPr>
+      <p:pic>
+        <p:nvPicPr>
+          <p:cNvPr id="3076" name="Picture 4">
+            <a:extLst>
+              <a:ext uri="{FF2B5EF4-FFF2-40B4-BE49-F238E27FC236}">
+                <a16:creationId xmlns:a16="http://schemas.microsoft.com/office/drawing/2014/main" id="{A81C02FF-9E5C-6DD8-FE46-FE4F175F4DA6}"/>
+              </a:ext>
+            </a:extLst>
+          </p:cNvPr>
+          <p:cNvPicPr>
+            <a:picLocks noChangeAspect="1" noChangeArrowheads="1"/>
+          </p:cNvPicPr>
+          <p:nvPr/>
+        </p:nvPicPr>
+        <p:blipFill rotWithShape="1">
+          <a:blip r:embed="rId2">
+            <a:extLst>
+              <a:ext uri="{28A0092B-C50C-407E-A947-70E740481C1C}">
+                <a14:useLocalDpi xmlns:a14="http://schemas.microsoft.com/office/drawing/2010/main" val="0"/>
+              </a:ext>
+            </a:extLst>
+          </a:blip>
+          <a:srcRect l="3442" t="10290" r="3949" b="9855"/>
+          <a:stretch/>
+        </p:blipFill>
+        <p:spPr bwMode="auto">
+          <a:xfrm>
+            <a:off x="1053548" y="0"/>
+            <a:ext cx="10604386" cy="6858000"/>
+          </a:xfrm>
+          <a:prstGeom prst="rect">
+            <a:avLst/>
+          </a:prstGeom>
+          <a:noFill/>
+          <a:extLst>
+            <a:ext uri="{909E8E84-426E-40DD-AFC4-6F175D3DCCD1}">
+              <a14:hiddenFill xmlns:a14="http://schemas.microsoft.com/office/drawing/2010/main">
+                <a:solidFill>
+                  <a:srgbClr val="FFFFFF"/>
+                </a:solidFill>
+              </a14:hiddenFill>
+            </a:ext>
+          </a:extLst>
+        </p:spPr>
+      </p:pic>
+    </p:spTree>
+    <p:extLst>
+      <p:ext uri="{BB962C8B-B14F-4D97-AF65-F5344CB8AC3E}">
+        <p14:creationId xmlns:p14="http://schemas.microsoft.com/office/powerpoint/2010/main" val="4069916316"/>
+      </p:ext>
+    </p:extLst>
+  </p:cSld>
+  <p:clrMapOvr>
+    <a:masterClrMapping/>
+  </p:clrMapOvr>
+</p:sld>
+</file>
+
+<file path=ppt/slides/slide8.xml><?xml version="1.0" encoding="utf-8"?>
+<p:sld xmlns:a="http://schemas.openxmlformats.org/drawingml/2006/main" xmlns:r="http://schemas.openxmlformats.org/officeDocument/2006/relationships" xmlns:p="http://schemas.openxmlformats.org/presentationml/2006/main">
+  <p:cSld>
+    <p:spTree>
+      <p:nvGrpSpPr>
+        <p:cNvPr id="1" name=""/>
+        <p:cNvGrpSpPr/>
+        <p:nvPr/>
+      </p:nvGrpSpPr>
+      <p:grpSpPr>
+        <a:xfrm>
+          <a:off x="0" y="0"/>
+          <a:ext cx="0" cy="0"/>
+          <a:chOff x="0" y="0"/>
+          <a:chExt cx="0" cy="0"/>
+        </a:xfrm>
+      </p:grpSpPr>
+      <p:pic>
+        <p:nvPicPr>
+          <p:cNvPr id="4100" name="Picture 4">
+            <a:extLst>
+              <a:ext uri="{FF2B5EF4-FFF2-40B4-BE49-F238E27FC236}">
+                <a16:creationId xmlns:a16="http://schemas.microsoft.com/office/drawing/2014/main" id="{4F302ECF-FE74-FB2F-D0BC-2E7FD023E037}"/>
+              </a:ext>
+            </a:extLst>
+          </p:cNvPr>
+          <p:cNvPicPr>
+            <a:picLocks noChangeAspect="1" noChangeArrowheads="1"/>
+          </p:cNvPicPr>
+          <p:nvPr/>
+        </p:nvPicPr>
+        <p:blipFill rotWithShape="1">
+          <a:blip r:embed="rId2">
+            <a:extLst>
+              <a:ext uri="{28A0092B-C50C-407E-A947-70E740481C1C}">
+                <a14:useLocalDpi xmlns:a14="http://schemas.microsoft.com/office/drawing/2010/main" val="0"/>
+              </a:ext>
+            </a:extLst>
+          </a:blip>
+          <a:srcRect l="5942" t="10871" r="6014" b="8405"/>
+          <a:stretch/>
+        </p:blipFill>
+        <p:spPr bwMode="auto">
+          <a:xfrm>
+            <a:off x="944216" y="0"/>
+            <a:ext cx="9973035" cy="6858000"/>
+          </a:xfrm>
+          <a:prstGeom prst="rect">
+            <a:avLst/>
+          </a:prstGeom>
+          <a:noFill/>
+          <a:extLst>
+            <a:ext uri="{909E8E84-426E-40DD-AFC4-6F175D3DCCD1}">
+              <a14:hiddenFill xmlns:a14="http://schemas.microsoft.com/office/drawing/2010/main">
+                <a:solidFill>
+                  <a:srgbClr val="FFFFFF"/>
+                </a:solidFill>
+              </a14:hiddenFill>
+            </a:ext>
+          </a:extLst>
+        </p:spPr>
+      </p:pic>
+    </p:spTree>
+    <p:extLst>
+      <p:ext uri="{BB962C8B-B14F-4D97-AF65-F5344CB8AC3E}">
+        <p14:creationId xmlns:p14="http://schemas.microsoft.com/office/powerpoint/2010/main" val="1564566837"/>
+      </p:ext>
+    </p:extLst>
+  </p:cSld>
+  <p:clrMapOvr>
+    <a:masterClrMapping/>
+  </p:clrMapOvr>
+</p:sld>
+</file>
+
+<file path=ppt/slides/slide9.xml><?xml version="1.0" encoding="utf-8"?>
+<p:sld xmlns:a="http://schemas.openxmlformats.org/drawingml/2006/main" xmlns:r="http://schemas.openxmlformats.org/officeDocument/2006/relationships" xmlns:p="http://schemas.openxmlformats.org/presentationml/2006/main">
+  <p:cSld>
+    <p:spTree>
+      <p:nvGrpSpPr>
+        <p:cNvPr id="1" name=""/>
+        <p:cNvGrpSpPr/>
+        <p:nvPr/>
+      </p:nvGrpSpPr>
+      <p:grpSpPr>
+        <a:xfrm>
+          <a:off x="0" y="0"/>
+          <a:ext cx="0" cy="0"/>
+          <a:chOff x="0" y="0"/>
+          <a:chExt cx="0" cy="0"/>
+        </a:xfrm>
+      </p:grpSpPr>
+      <p:pic>
+        <p:nvPicPr>
+          <p:cNvPr id="5122" name="Picture 2">
+            <a:extLst>
+              <a:ext uri="{FF2B5EF4-FFF2-40B4-BE49-F238E27FC236}">
+                <a16:creationId xmlns:a16="http://schemas.microsoft.com/office/drawing/2014/main" id="{CC0A14A8-CD15-B592-344D-8EB5F5B65344}"/>
+              </a:ext>
+            </a:extLst>
+          </p:cNvPr>
+          <p:cNvPicPr>
+            <a:picLocks noChangeAspect="1" noChangeArrowheads="1"/>
+          </p:cNvPicPr>
+          <p:nvPr/>
+        </p:nvPicPr>
+        <p:blipFill>
+          <a:blip r:embed="rId2">
+            <a:extLst>
+              <a:ext uri="{28A0092B-C50C-407E-A947-70E740481C1C}">
+                <a14:useLocalDpi xmlns:a14="http://schemas.microsoft.com/office/drawing/2010/main" val="0"/>
+              </a:ext>
+            </a:extLst>
+          </a:blip>
+          <a:srcRect/>
+          <a:stretch>
+            <a:fillRect/>
+          </a:stretch>
+        </p:blipFill>
+        <p:spPr bwMode="auto">
+          <a:xfrm>
+            <a:off x="1524000" y="0"/>
+            <a:ext cx="9144000" cy="6858000"/>
+          </a:xfrm>
+          <a:prstGeom prst="rect">
+            <a:avLst/>
+          </a:prstGeom>
+          <a:noFill/>
+          <a:extLst>
+            <a:ext uri="{909E8E84-426E-40DD-AFC4-6F175D3DCCD1}">
+              <a14:hiddenFill xmlns:a14="http://schemas.microsoft.com/office/drawing/2010/main">
+                <a:solidFill>
+                  <a:srgbClr val="FFFFFF"/>
+                </a:solidFill>
+              </a14:hiddenFill>
+            </a:ext>
+          </a:extLst>
+        </p:spPr>
+      </p:pic>
+    </p:spTree>
+    <p:extLst>
+      <p:ext uri="{BB962C8B-B14F-4D97-AF65-F5344CB8AC3E}">
+        <p14:creationId xmlns:p14="http://schemas.microsoft.com/office/powerpoint/2010/main" val="3934463844"/>
       </p:ext>
     </p:extLst>
   </p:cSld>
@@ -4608,4 +6423,299 @@
     </a:ext>
   </a:extLst>
 </a:theme>
+</file>
+
+<file path=ppt/theme/theme2.xml><?xml version="1.0" encoding="utf-8"?>
+<a:theme xmlns:a="http://schemas.openxmlformats.org/drawingml/2006/main" name="Office 主题​​">
+  <a:themeElements>
+    <a:clrScheme name="Office">
+      <a:dk1>
+        <a:sysClr val="windowText" lastClr="000000"/>
+      </a:dk1>
+      <a:lt1>
+        <a:sysClr val="window" lastClr="FFFFFF"/>
+      </a:lt1>
+      <a:dk2>
+        <a:srgbClr val="44546A"/>
+      </a:dk2>
+      <a:lt2>
+        <a:srgbClr val="E7E6E6"/>
+      </a:lt2>
+      <a:accent1>
+        <a:srgbClr val="4472C4"/>
+      </a:accent1>
+      <a:accent2>
+        <a:srgbClr val="ED7D31"/>
+      </a:accent2>
+      <a:accent3>
+        <a:srgbClr val="A5A5A5"/>
+      </a:accent3>
+      <a:accent4>
+        <a:srgbClr val="FFC000"/>
+      </a:accent4>
+      <a:accent5>
+        <a:srgbClr val="5B9BD5"/>
+      </a:accent5>
+      <a:accent6>
+        <a:srgbClr val="70AD47"/>
+      </a:accent6>
+      <a:hlink>
+        <a:srgbClr val="0563C1"/>
+      </a:hlink>
+      <a:folHlink>
+        <a:srgbClr val="954F72"/>
+      </a:folHlink>
+    </a:clrScheme>
+    <a:fontScheme name="Office">
+      <a:majorFont>
+        <a:latin typeface="等线 Light" panose="020F0302020204030204"/>
+        <a:ea typeface=""/>
+        <a:cs typeface=""/>
+        <a:font script="Jpan" typeface="游ゴシック Light"/>
+        <a:font script="Hang" typeface="맑은 고딕"/>
+        <a:font script="Hans" typeface="等线 Light"/>
+        <a:font script="Hant" typeface="新細明體"/>
+        <a:font script="Arab" typeface="Times New Roman"/>
+        <a:font script="Hebr" typeface="Times New Roman"/>
+        <a:font script="Thai" typeface="Angsana New"/>
+        <a:font script="Ethi" typeface="Nyala"/>
+        <a:font script="Beng" typeface="Vrinda"/>
+        <a:font script="Gujr" typeface="Shruti"/>
+        <a:font script="Khmr" typeface="MoolBoran"/>
+        <a:font script="Knda" typeface="Tunga"/>
+        <a:font script="Guru" typeface="Raavi"/>
+        <a:font script="Cans" typeface="Euphemia"/>
+        <a:font script="Cher" typeface="Plantagenet Cherokee"/>
+        <a:font script="Yiii" typeface="Microsoft Yi Baiti"/>
+        <a:font script="Tibt" typeface="Microsoft Himalaya"/>
+        <a:font script="Thaa" typeface="MV Boli"/>
+        <a:font script="Deva" typeface="Mangal"/>
+        <a:font script="Telu" typeface="Gautami"/>
+        <a:font script="Taml" typeface="Latha"/>
+        <a:font script="Syrc" typeface="Estrangelo Edessa"/>
+        <a:font script="Orya" typeface="Kalinga"/>
+        <a:font script="Mlym" typeface="Kartika"/>
+        <a:font script="Laoo" typeface="DokChampa"/>
+        <a:font script="Sinh" typeface="Iskoola Pota"/>
+        <a:font script="Mong" typeface="Mongolian Baiti"/>
+        <a:font script="Viet" typeface="Times New Roman"/>
+        <a:font script="Uigh" typeface="Microsoft Uighur"/>
+        <a:font script="Geor" typeface="Sylfaen"/>
+        <a:font script="Armn" typeface="Arial"/>
+        <a:font script="Bugi" typeface="Leelawadee UI"/>
+        <a:font script="Bopo" typeface="Microsoft JhengHei"/>
+        <a:font script="Java" typeface="Javanese Text"/>
+        <a:font script="Lisu" typeface="Segoe UI"/>
+        <a:font script="Mymr" typeface="Myanmar Text"/>
+        <a:font script="Nkoo" typeface="Ebrima"/>
+        <a:font script="Olck" typeface="Nirmala UI"/>
+        <a:font script="Osma" typeface="Ebrima"/>
+        <a:font script="Phag" typeface="Phagspa"/>
+        <a:font script="Syrn" typeface="Estrangelo Edessa"/>
+        <a:font script="Syrj" typeface="Estrangelo Edessa"/>
+        <a:font script="Syre" typeface="Estrangelo Edessa"/>
+        <a:font script="Sora" typeface="Nirmala UI"/>
+        <a:font script="Tale" typeface="Microsoft Tai Le"/>
+        <a:font script="Talu" typeface="Microsoft New Tai Lue"/>
+        <a:font script="Tfng" typeface="Ebrima"/>
+      </a:majorFont>
+      <a:minorFont>
+        <a:latin typeface="等线" panose="020F0502020204030204"/>
+        <a:ea typeface=""/>
+        <a:cs typeface=""/>
+        <a:font script="Jpan" typeface="游ゴシック"/>
+        <a:font script="Hang" typeface="맑은 고딕"/>
+        <a:font script="Hans" typeface="等线"/>
+        <a:font script="Hant" typeface="新細明體"/>
+        <a:font script="Arab" typeface="Arial"/>
+        <a:font script="Hebr" typeface="Arial"/>
+        <a:font script="Thai" typeface="Cordia New"/>
+        <a:font script="Ethi" typeface="Nyala"/>
+        <a:font script="Beng" typeface="Vrinda"/>
+        <a:font script="Gujr" typeface="Shruti"/>
+        <a:font script="Khmr" typeface="DaunPenh"/>
+        <a:font script="Knda" typeface="Tunga"/>
+        <a:font script="Guru" typeface="Raavi"/>
+        <a:font script="Cans" typeface="Euphemia"/>
+        <a:font script="Cher" typeface="Plantagenet Cherokee"/>
+        <a:font script="Yiii" typeface="Microsoft Yi Baiti"/>
+        <a:font script="Tibt" typeface="Microsoft Himalaya"/>
+        <a:font script="Thaa" typeface="MV Boli"/>
+        <a:font script="Deva" typeface="Mangal"/>
+        <a:font script="Telu" typeface="Gautami"/>
+        <a:font script="Taml" typeface="Latha"/>
+        <a:font script="Syrc" typeface="Estrangelo Edessa"/>
+        <a:font script="Orya" typeface="Kalinga"/>
+        <a:font script="Mlym" typeface="Kartika"/>
+        <a:font script="Laoo" typeface="DokChampa"/>
+        <a:font script="Sinh" typeface="Iskoola Pota"/>
+        <a:font script="Mong" typeface="Mongolian Baiti"/>
+        <a:font script="Viet" typeface="Arial"/>
+        <a:font script="Uigh" typeface="Microsoft Uighur"/>
+        <a:font script="Geor" typeface="Sylfaen"/>
+        <a:font script="Armn" typeface="Arial"/>
+        <a:font script="Bugi" typeface="Leelawadee UI"/>
+        <a:font script="Bopo" typeface="Microsoft JhengHei"/>
+        <a:font script="Java" typeface="Javanese Text"/>
+        <a:font script="Lisu" typeface="Segoe UI"/>
+        <a:font script="Mymr" typeface="Myanmar Text"/>
+        <a:font script="Nkoo" typeface="Ebrima"/>
+        <a:font script="Olck" typeface="Nirmala UI"/>
+        <a:font script="Osma" typeface="Ebrima"/>
+        <a:font script="Phag" typeface="Phagspa"/>
+        <a:font script="Syrn" typeface="Estrangelo Edessa"/>
+        <a:font script="Syrj" typeface="Estrangelo Edessa"/>
+        <a:font script="Syre" typeface="Estrangelo Edessa"/>
+        <a:font script="Sora" typeface="Nirmala UI"/>
+        <a:font script="Tale" typeface="Microsoft Tai Le"/>
+        <a:font script="Talu" typeface="Microsoft New Tai Lue"/>
+        <a:font script="Tfng" typeface="Ebrima"/>
+      </a:minorFont>
+    </a:fontScheme>
+    <a:fmtScheme name="Office">
+      <a:fillStyleLst>
+        <a:solidFill>
+          <a:schemeClr val="phClr"/>
+        </a:solidFill>
+        <a:gradFill rotWithShape="1">
+          <a:gsLst>
+            <a:gs pos="0">
+              <a:schemeClr val="phClr">
+                <a:lumMod val="110000"/>
+                <a:satMod val="105000"/>
+                <a:tint val="67000"/>
+              </a:schemeClr>
+            </a:gs>
+            <a:gs pos="50000">
+              <a:schemeClr val="phClr">
+                <a:lumMod val="105000"/>
+                <a:satMod val="103000"/>
+                <a:tint val="73000"/>
+              </a:schemeClr>
+            </a:gs>
+            <a:gs pos="100000">
+              <a:schemeClr val="phClr">
+                <a:lumMod val="105000"/>
+                <a:satMod val="109000"/>
+                <a:tint val="81000"/>
+              </a:schemeClr>
+            </a:gs>
+          </a:gsLst>
+          <a:lin ang="5400000" scaled="0"/>
+        </a:gradFill>
+        <a:gradFill rotWithShape="1">
+          <a:gsLst>
+            <a:gs pos="0">
+              <a:schemeClr val="phClr">
+                <a:satMod val="103000"/>
+                <a:lumMod val="102000"/>
+                <a:tint val="94000"/>
+              </a:schemeClr>
+            </a:gs>
+            <a:gs pos="50000">
+              <a:schemeClr val="phClr">
+                <a:satMod val="110000"/>
+                <a:lumMod val="100000"/>
+                <a:shade val="100000"/>
+              </a:schemeClr>
+            </a:gs>
+            <a:gs pos="100000">
+              <a:schemeClr val="phClr">
+                <a:lumMod val="99000"/>
+                <a:satMod val="120000"/>
+                <a:shade val="78000"/>
+              </a:schemeClr>
+            </a:gs>
+          </a:gsLst>
+          <a:lin ang="5400000" scaled="0"/>
+        </a:gradFill>
+      </a:fillStyleLst>
+      <a:lnStyleLst>
+        <a:ln w="6350" cap="flat" cmpd="sng" algn="ctr">
+          <a:solidFill>
+            <a:schemeClr val="phClr"/>
+          </a:solidFill>
+          <a:prstDash val="solid"/>
+          <a:miter lim="800000"/>
+        </a:ln>
+        <a:ln w="12700" cap="flat" cmpd="sng" algn="ctr">
+          <a:solidFill>
+            <a:schemeClr val="phClr"/>
+          </a:solidFill>
+          <a:prstDash val="solid"/>
+          <a:miter lim="800000"/>
+        </a:ln>
+        <a:ln w="19050" cap="flat" cmpd="sng" algn="ctr">
+          <a:solidFill>
+            <a:schemeClr val="phClr"/>
+          </a:solidFill>
+          <a:prstDash val="solid"/>
+          <a:miter lim="800000"/>
+        </a:ln>
+      </a:lnStyleLst>
+      <a:effectStyleLst>
+        <a:effectStyle>
+          <a:effectLst/>
+        </a:effectStyle>
+        <a:effectStyle>
+          <a:effectLst/>
+        </a:effectStyle>
+        <a:effectStyle>
+          <a:effectLst>
+            <a:outerShdw blurRad="57150" dist="19050" dir="5400000" algn="ctr" rotWithShape="0">
+              <a:srgbClr val="000000">
+                <a:alpha val="63000"/>
+              </a:srgbClr>
+            </a:outerShdw>
+          </a:effectLst>
+        </a:effectStyle>
+      </a:effectStyleLst>
+      <a:bgFillStyleLst>
+        <a:solidFill>
+          <a:schemeClr val="phClr"/>
+        </a:solidFill>
+        <a:solidFill>
+          <a:schemeClr val="phClr">
+            <a:tint val="95000"/>
+            <a:satMod val="170000"/>
+          </a:schemeClr>
+        </a:solidFill>
+        <a:gradFill rotWithShape="1">
+          <a:gsLst>
+            <a:gs pos="0">
+              <a:schemeClr val="phClr">
+                <a:tint val="93000"/>
+                <a:satMod val="150000"/>
+                <a:shade val="98000"/>
+                <a:lumMod val="102000"/>
+              </a:schemeClr>
+            </a:gs>
+            <a:gs pos="50000">
+              <a:schemeClr val="phClr">
+                <a:tint val="98000"/>
+                <a:satMod val="130000"/>
+                <a:shade val="90000"/>
+                <a:lumMod val="103000"/>
+              </a:schemeClr>
+            </a:gs>
+            <a:gs pos="100000">
+              <a:schemeClr val="phClr">
+                <a:shade val="63000"/>
+                <a:satMod val="120000"/>
+              </a:schemeClr>
+            </a:gs>
+          </a:gsLst>
+          <a:lin ang="5400000" scaled="0"/>
+        </a:gradFill>
+      </a:bgFillStyleLst>
+    </a:fmtScheme>
+  </a:themeElements>
+  <a:objectDefaults/>
+  <a:extraClrSchemeLst/>
+  <a:extLst>
+    <a:ext uri="{05A4C25C-085E-4340-85A3-A5531E510DB2}">
+      <thm15:themeFamily xmlns:thm15="http://schemas.microsoft.com/office/thememl/2012/main" name="Office Theme" id="{62F939B6-93AF-4DB8-9C6B-D6C7DFDC589F}" vid="{4A3C46E8-61CC-4603-A589-7422A47A8E4A}"/>
+    </a:ext>
+  </a:extLst>
+</a:theme>
 </file>
</xml_diff>